<commit_message>
Prezentace upravena Doplněny odpovědi na otázky.
</commit_message>
<xml_diff>
--- a/prezentace diplomka/DP_Diani.pptx
+++ b/prezentace diplomka/DP_Diani.pptx
@@ -5,7 +5,7 @@
     <p:sldMasterId id="2147483648" r:id="rId1"/>
   </p:sldMasterIdLst>
   <p:notesMasterIdLst>
-    <p:notesMasterId r:id="rId29"/>
+    <p:notesMasterId r:id="rId32"/>
   </p:notesMasterIdLst>
   <p:sldIdLst>
     <p:sldId id="256" r:id="rId2"/>
@@ -24,8 +24,8 @@
     <p:sldId id="289" r:id="rId15"/>
     <p:sldId id="282" r:id="rId16"/>
     <p:sldId id="269" r:id="rId17"/>
-    <p:sldId id="279" r:id="rId18"/>
-    <p:sldId id="286" r:id="rId19"/>
+    <p:sldId id="286" r:id="rId18"/>
+    <p:sldId id="294" r:id="rId19"/>
     <p:sldId id="280" r:id="rId20"/>
     <p:sldId id="283" r:id="rId21"/>
     <p:sldId id="285" r:id="rId22"/>
@@ -35,6 +35,9 @@
     <p:sldId id="262" r:id="rId26"/>
     <p:sldId id="270" r:id="rId27"/>
     <p:sldId id="265" r:id="rId28"/>
+    <p:sldId id="291" r:id="rId29"/>
+    <p:sldId id="292" r:id="rId30"/>
+    <p:sldId id="293" r:id="rId31"/>
   </p:sldIdLst>
   <p:sldSz cx="12192000" cy="6858000"/>
   <p:notesSz cx="6858000" cy="9144000"/>
@@ -242,7 +245,7 @@
           <a:p>
             <a:fld id="{95C8B843-1916-423D-A1DA-BF80B31ADF72}" type="datetimeFigureOut">
               <a:rPr lang="en-US" smtClean="0"/>
-              <a:t>6/9/2017</a:t>
+              <a:t>6/10/2017</a:t>
             </a:fld>
             <a:endParaRPr lang="en-US"/>
           </a:p>
@@ -758,11 +761,7 @@
             </a:br>
             <a:r>
               <a:rPr lang="cs-CZ" dirty="0" smtClean="0"/>
-              <a:t>Položky na levé straně byli implementovány </a:t>
-            </a:r>
-            <a:r>
-              <a:rPr lang="cs-CZ" dirty="0" smtClean="0"/>
-              <a:t>mnou</a:t>
+              <a:t>Položky na levé straně byli implementovány mnou</a:t>
             </a:r>
           </a:p>
           <a:p>
@@ -1181,7 +1180,7 @@
           <a:p>
             <a:r>
               <a:rPr lang="cs-CZ" dirty="0" smtClean="0"/>
-              <a:t>Zde je vidět zjednodušený diagram  modulu pro hledání jídelních situací</a:t>
+              <a:t>Podrobněji se podíváme na samotný algoritmus</a:t>
             </a:r>
             <a:endParaRPr lang="cs-CZ" dirty="0"/>
           </a:p>
@@ -1213,7 +1212,7 @@
     </p:spTree>
     <p:extLst>
       <p:ext uri="{BB962C8B-B14F-4D97-AF65-F5344CB8AC3E}">
-        <p14:creationId xmlns:p14="http://schemas.microsoft.com/office/powerpoint/2010/main" val="2181000521"/>
+        <p14:creationId xmlns:p14="http://schemas.microsoft.com/office/powerpoint/2010/main" val="3859641528"/>
       </p:ext>
     </p:extLst>
   </p:cSld>
@@ -1301,7 +1300,7 @@
     </p:spTree>
     <p:extLst>
       <p:ext uri="{BB962C8B-B14F-4D97-AF65-F5344CB8AC3E}">
-        <p14:creationId xmlns:p14="http://schemas.microsoft.com/office/powerpoint/2010/main" val="3859641528"/>
+        <p14:creationId xmlns:p14="http://schemas.microsoft.com/office/powerpoint/2010/main" val="1221048222"/>
       </p:ext>
     </p:extLst>
   </p:cSld>
@@ -2172,6 +2171,403 @@
 </p:notes>
 </file>
 
+<file path=ppt/notesSlides/notesSlide24.xml><?xml version="1.0" encoding="utf-8"?>
+<p:notes xmlns:a="http://schemas.openxmlformats.org/drawingml/2006/main" xmlns:r="http://schemas.openxmlformats.org/officeDocument/2006/relationships" xmlns:p="http://schemas.openxmlformats.org/presentationml/2006/main">
+  <p:cSld>
+    <p:spTree>
+      <p:nvGrpSpPr>
+        <p:cNvPr id="1" name=""/>
+        <p:cNvGrpSpPr/>
+        <p:nvPr/>
+      </p:nvGrpSpPr>
+      <p:grpSpPr>
+        <a:xfrm>
+          <a:off x="0" y="0"/>
+          <a:ext cx="0" cy="0"/>
+          <a:chOff x="0" y="0"/>
+          <a:chExt cx="0" cy="0"/>
+        </a:xfrm>
+      </p:grpSpPr>
+      <p:sp>
+        <p:nvSpPr>
+          <p:cNvPr id="2" name="Zástupný symbol pro obrázek snímku 1"/>
+          <p:cNvSpPr>
+            <a:spLocks noGrp="1" noRot="1" noChangeAspect="1"/>
+          </p:cNvSpPr>
+          <p:nvPr>
+            <p:ph type="sldImg"/>
+          </p:nvPr>
+        </p:nvSpPr>
+        <p:spPr/>
+      </p:sp>
+      <p:sp>
+        <p:nvSpPr>
+          <p:cNvPr id="3" name="Zástupný symbol pro poznámky 2"/>
+          <p:cNvSpPr>
+            <a:spLocks noGrp="1"/>
+          </p:cNvSpPr>
+          <p:nvPr>
+            <p:ph type="body" idx="1"/>
+          </p:nvPr>
+        </p:nvSpPr>
+        <p:spPr/>
+        <p:txBody>
+          <a:bodyPr/>
+          <a:lstStyle/>
+          <a:p>
+            <a:r>
+              <a:rPr lang="cs-CZ" dirty="0" smtClean="0"/>
+              <a:t>Hesla nejsou uložena</a:t>
+            </a:r>
+            <a:r>
+              <a:rPr lang="cs-CZ" baseline="0" dirty="0" smtClean="0"/>
+              <a:t> přímo do databáze, ale jsou nejprve </a:t>
+            </a:r>
+            <a:r>
+              <a:rPr lang="cs-CZ" baseline="0" dirty="0" err="1" smtClean="0"/>
+              <a:t>Hashována</a:t>
+            </a:r>
+            <a:r>
+              <a:rPr lang="cs-CZ" baseline="0" dirty="0" smtClean="0"/>
+              <a:t>.</a:t>
+            </a:r>
+          </a:p>
+          <a:p>
+            <a:r>
+              <a:rPr lang="cs-CZ" baseline="0" dirty="0" smtClean="0"/>
+              <a:t>Pro zajištění proti statistickým útoků a kolizním útokům </a:t>
+            </a:r>
+            <a:r>
+              <a:rPr lang="cs-CZ" baseline="0" dirty="0" err="1" smtClean="0"/>
+              <a:t>hashovacích</a:t>
+            </a:r>
+            <a:r>
+              <a:rPr lang="cs-CZ" baseline="0" dirty="0" smtClean="0"/>
+              <a:t> funkcí je </a:t>
+            </a:r>
+            <a:r>
+              <a:rPr lang="cs-CZ" baseline="0" dirty="0" err="1" smtClean="0"/>
+              <a:t>hashování</a:t>
+            </a:r>
+            <a:r>
+              <a:rPr lang="cs-CZ" baseline="0" dirty="0" smtClean="0"/>
+              <a:t> hesel kombinováno s tzv. solí (saltem).</a:t>
+            </a:r>
+          </a:p>
+          <a:p>
+            <a:r>
+              <a:rPr lang="cs-CZ" baseline="0" dirty="0" smtClean="0"/>
+              <a:t>Sůl je generována náhodným způsobem</a:t>
+            </a:r>
+          </a:p>
+          <a:p>
+            <a:r>
+              <a:rPr lang="cs-CZ" baseline="0" dirty="0" smtClean="0"/>
+              <a:t>A způsob a postup </a:t>
+            </a:r>
+            <a:r>
+              <a:rPr lang="cs-CZ" baseline="0" dirty="0" err="1" smtClean="0"/>
+              <a:t>Hashování</a:t>
+            </a:r>
+            <a:r>
+              <a:rPr lang="cs-CZ" baseline="0" dirty="0" smtClean="0"/>
+              <a:t> resp. šifrování hesla je tajný (lze využívat různé iterace a další operace).</a:t>
+            </a:r>
+          </a:p>
+          <a:p>
+            <a:endParaRPr lang="cs-CZ" dirty="0"/>
+          </a:p>
+        </p:txBody>
+      </p:sp>
+      <p:sp>
+        <p:nvSpPr>
+          <p:cNvPr id="4" name="Zástupný symbol pro číslo snímku 3"/>
+          <p:cNvSpPr>
+            <a:spLocks noGrp="1"/>
+          </p:cNvSpPr>
+          <p:nvPr>
+            <p:ph type="sldNum" sz="quarter" idx="10"/>
+          </p:nvPr>
+        </p:nvSpPr>
+        <p:spPr/>
+        <p:txBody>
+          <a:bodyPr/>
+          <a:lstStyle/>
+          <a:p>
+            <a:fld id="{FD9D58AD-6389-4BE8-9750-33B383CC1FA5}" type="slidenum">
+              <a:rPr lang="en-US" smtClean="0"/>
+              <a:t>28</a:t>
+            </a:fld>
+            <a:endParaRPr lang="en-US"/>
+          </a:p>
+        </p:txBody>
+      </p:sp>
+    </p:spTree>
+    <p:extLst>
+      <p:ext uri="{BB962C8B-B14F-4D97-AF65-F5344CB8AC3E}">
+        <p14:creationId xmlns:p14="http://schemas.microsoft.com/office/powerpoint/2010/main" val="2369570913"/>
+      </p:ext>
+    </p:extLst>
+  </p:cSld>
+  <p:clrMapOvr>
+    <a:masterClrMapping/>
+  </p:clrMapOvr>
+</p:notes>
+</file>
+
+<file path=ppt/notesSlides/notesSlide25.xml><?xml version="1.0" encoding="utf-8"?>
+<p:notes xmlns:a="http://schemas.openxmlformats.org/drawingml/2006/main" xmlns:r="http://schemas.openxmlformats.org/officeDocument/2006/relationships" xmlns:p="http://schemas.openxmlformats.org/presentationml/2006/main">
+  <p:cSld>
+    <p:spTree>
+      <p:nvGrpSpPr>
+        <p:cNvPr id="1" name=""/>
+        <p:cNvGrpSpPr/>
+        <p:nvPr/>
+      </p:nvGrpSpPr>
+      <p:grpSpPr>
+        <a:xfrm>
+          <a:off x="0" y="0"/>
+          <a:ext cx="0" cy="0"/>
+          <a:chOff x="0" y="0"/>
+          <a:chExt cx="0" cy="0"/>
+        </a:xfrm>
+      </p:grpSpPr>
+      <p:sp>
+        <p:nvSpPr>
+          <p:cNvPr id="2" name="Zástupný symbol pro obrázek snímku 1"/>
+          <p:cNvSpPr>
+            <a:spLocks noGrp="1" noRot="1" noChangeAspect="1"/>
+          </p:cNvSpPr>
+          <p:nvPr>
+            <p:ph type="sldImg"/>
+          </p:nvPr>
+        </p:nvSpPr>
+        <p:spPr/>
+      </p:sp>
+      <p:sp>
+        <p:nvSpPr>
+          <p:cNvPr id="3" name="Zástupný symbol pro poznámky 2"/>
+          <p:cNvSpPr>
+            <a:spLocks noGrp="1"/>
+          </p:cNvSpPr>
+          <p:nvPr>
+            <p:ph type="body" idx="1"/>
+          </p:nvPr>
+        </p:nvSpPr>
+        <p:spPr/>
+        <p:txBody>
+          <a:bodyPr/>
+          <a:lstStyle/>
+          <a:p>
+            <a:r>
+              <a:rPr lang="cs-CZ" dirty="0" smtClean="0"/>
+              <a:t>Zadáním bylo vytvořit webovou aplikaci nad existujícím monitorovacím systémem. Tedy využít existující prostředků nad databází MS</a:t>
+            </a:r>
+            <a:r>
+              <a:rPr lang="cs-CZ" baseline="0" dirty="0" smtClean="0"/>
+              <a:t> SQL.</a:t>
+            </a:r>
+          </a:p>
+          <a:p>
+            <a:r>
+              <a:rPr lang="cs-CZ" baseline="0" dirty="0" smtClean="0"/>
+              <a:t>Vytváření REST API  pro celou aplikaci by bylo tedy kontraproduktivní s ohledem na zadání, které se zaměřovalo na vytvoření webové aplikace.</a:t>
+            </a:r>
+          </a:p>
+          <a:p>
+            <a:r>
+              <a:rPr lang="cs-CZ" baseline="0" dirty="0" smtClean="0"/>
+              <a:t>Tento návrhový vzor je užitečný v případě chcete-li vytvořit komunikační mezivrstvu kterou bude využívat více aplikací (krom webové, např. mobilní)</a:t>
+            </a:r>
+          </a:p>
+          <a:p>
+            <a:r>
+              <a:rPr lang="cs-CZ" baseline="0" dirty="0" smtClean="0"/>
+              <a:t>V aplikaci jsem ji, ale částečně implementoval jako například pro vyhledávání v seznamu zobrazených pacientů, výběru dat pro graf při přesunu na časové ose.</a:t>
+            </a:r>
+          </a:p>
+        </p:txBody>
+      </p:sp>
+      <p:sp>
+        <p:nvSpPr>
+          <p:cNvPr id="4" name="Zástupný symbol pro číslo snímku 3"/>
+          <p:cNvSpPr>
+            <a:spLocks noGrp="1"/>
+          </p:cNvSpPr>
+          <p:nvPr>
+            <p:ph type="sldNum" sz="quarter" idx="10"/>
+          </p:nvPr>
+        </p:nvSpPr>
+        <p:spPr/>
+        <p:txBody>
+          <a:bodyPr/>
+          <a:lstStyle/>
+          <a:p>
+            <a:fld id="{FD9D58AD-6389-4BE8-9750-33B383CC1FA5}" type="slidenum">
+              <a:rPr lang="en-US" smtClean="0"/>
+              <a:t>29</a:t>
+            </a:fld>
+            <a:endParaRPr lang="en-US"/>
+          </a:p>
+        </p:txBody>
+      </p:sp>
+    </p:spTree>
+    <p:extLst>
+      <p:ext uri="{BB962C8B-B14F-4D97-AF65-F5344CB8AC3E}">
+        <p14:creationId xmlns:p14="http://schemas.microsoft.com/office/powerpoint/2010/main" val="4007508152"/>
+      </p:ext>
+    </p:extLst>
+  </p:cSld>
+  <p:clrMapOvr>
+    <a:masterClrMapping/>
+  </p:clrMapOvr>
+</p:notes>
+</file>
+
+<file path=ppt/notesSlides/notesSlide26.xml><?xml version="1.0" encoding="utf-8"?>
+<p:notes xmlns:a="http://schemas.openxmlformats.org/drawingml/2006/main" xmlns:r="http://schemas.openxmlformats.org/officeDocument/2006/relationships" xmlns:p="http://schemas.openxmlformats.org/presentationml/2006/main">
+  <p:cSld>
+    <p:spTree>
+      <p:nvGrpSpPr>
+        <p:cNvPr id="1" name=""/>
+        <p:cNvGrpSpPr/>
+        <p:nvPr/>
+      </p:nvGrpSpPr>
+      <p:grpSpPr>
+        <a:xfrm>
+          <a:off x="0" y="0"/>
+          <a:ext cx="0" cy="0"/>
+          <a:chOff x="0" y="0"/>
+          <a:chExt cx="0" cy="0"/>
+        </a:xfrm>
+      </p:grpSpPr>
+      <p:sp>
+        <p:nvSpPr>
+          <p:cNvPr id="2" name="Zástupný symbol pro obrázek snímku 1"/>
+          <p:cNvSpPr>
+            <a:spLocks noGrp="1" noRot="1" noChangeAspect="1"/>
+          </p:cNvSpPr>
+          <p:nvPr>
+            <p:ph type="sldImg"/>
+          </p:nvPr>
+        </p:nvSpPr>
+        <p:spPr/>
+      </p:sp>
+      <p:sp>
+        <p:nvSpPr>
+          <p:cNvPr id="3" name="Zástupný symbol pro poznámky 2"/>
+          <p:cNvSpPr>
+            <a:spLocks noGrp="1"/>
+          </p:cNvSpPr>
+          <p:nvPr>
+            <p:ph type="body" idx="1"/>
+          </p:nvPr>
+        </p:nvSpPr>
+        <p:spPr/>
+        <p:txBody>
+          <a:bodyPr/>
+          <a:lstStyle/>
+          <a:p>
+            <a:r>
+              <a:rPr lang="cs-CZ" dirty="0" smtClean="0"/>
+              <a:t>Kdybych aplikaci měl vytvářet zcela od začátku. Zaměřil bych se na důslednější separaci databázové logiky,</a:t>
+            </a:r>
+            <a:r>
+              <a:rPr lang="cs-CZ" baseline="0" dirty="0" smtClean="0"/>
+              <a:t> které by umožnilo rychlejší testování kódu a kód značně zpřehlednilo.</a:t>
+            </a:r>
+          </a:p>
+          <a:p>
+            <a:r>
+              <a:rPr lang="cs-CZ" baseline="0" dirty="0" smtClean="0"/>
+              <a:t>Dále bych při vytváření řídících tříd podle návrhového vzoru </a:t>
+            </a:r>
+            <a:r>
+              <a:rPr lang="cs-CZ" baseline="0" dirty="0" err="1" smtClean="0"/>
+              <a:t>facade</a:t>
+            </a:r>
+            <a:r>
+              <a:rPr lang="cs-CZ" baseline="0" dirty="0" smtClean="0"/>
+              <a:t> implementoval transportovaná data do </a:t>
+            </a:r>
+            <a:r>
+              <a:rPr lang="cs-CZ" baseline="0" dirty="0" err="1" smtClean="0"/>
+              <a:t>view</a:t>
+            </a:r>
+            <a:r>
+              <a:rPr lang="cs-CZ" baseline="0" dirty="0" smtClean="0"/>
+              <a:t> do samostatných modelů.</a:t>
+            </a:r>
+          </a:p>
+          <a:p>
+            <a:r>
+              <a:rPr lang="cs-CZ" baseline="0" dirty="0" smtClean="0"/>
+              <a:t>Větší část </a:t>
+            </a:r>
+            <a:r>
+              <a:rPr lang="cs-CZ" baseline="0" dirty="0" err="1" smtClean="0"/>
+              <a:t>controlerů</a:t>
+            </a:r>
+            <a:r>
+              <a:rPr lang="cs-CZ" baseline="0" dirty="0" smtClean="0"/>
+              <a:t> bych implementoval jako REST API, které je nativně podporováno až od poslední verze ASP.NET MVC (6).</a:t>
+            </a:r>
+          </a:p>
+          <a:p>
+            <a:r>
+              <a:rPr lang="cs-CZ" dirty="0" smtClean="0"/>
+              <a:t>Většinu ovládacích prvků bych implementoval pomocí technologie AJAX,</a:t>
+            </a:r>
+            <a:r>
+              <a:rPr lang="cs-CZ" baseline="0" dirty="0" smtClean="0"/>
+              <a:t> která by umožnila větší uživatelský komfort.</a:t>
+            </a:r>
+          </a:p>
+          <a:p>
+            <a:r>
+              <a:rPr lang="cs-CZ" baseline="0" dirty="0" smtClean="0"/>
+              <a:t>Aplikaci bych designoval tak, aby podporovala nejen rozlišení pro mobilní a standartní rozlišení běžných monitorů, ale i pro zařízení s vysokým rozlišením (např. chytré televize).</a:t>
+            </a:r>
+            <a:endParaRPr lang="cs-CZ" dirty="0"/>
+          </a:p>
+        </p:txBody>
+      </p:sp>
+      <p:sp>
+        <p:nvSpPr>
+          <p:cNvPr id="4" name="Zástupný symbol pro číslo snímku 3"/>
+          <p:cNvSpPr>
+            <a:spLocks noGrp="1"/>
+          </p:cNvSpPr>
+          <p:nvPr>
+            <p:ph type="sldNum" sz="quarter" idx="10"/>
+          </p:nvPr>
+        </p:nvSpPr>
+        <p:spPr/>
+        <p:txBody>
+          <a:bodyPr/>
+          <a:lstStyle/>
+          <a:p>
+            <a:fld id="{FD9D58AD-6389-4BE8-9750-33B383CC1FA5}" type="slidenum">
+              <a:rPr lang="en-US" smtClean="0"/>
+              <a:t>30</a:t>
+            </a:fld>
+            <a:endParaRPr lang="en-US"/>
+          </a:p>
+        </p:txBody>
+      </p:sp>
+    </p:spTree>
+    <p:extLst>
+      <p:ext uri="{BB962C8B-B14F-4D97-AF65-F5344CB8AC3E}">
+        <p14:creationId xmlns:p14="http://schemas.microsoft.com/office/powerpoint/2010/main" val="3915461805"/>
+      </p:ext>
+    </p:extLst>
+  </p:cSld>
+  <p:clrMapOvr>
+    <a:masterClrMapping/>
+  </p:clrMapOvr>
+</p:notes>
+</file>
+
 <file path=ppt/notesSlides/notesSlide3.xml><?xml version="1.0" encoding="utf-8"?>
 <p:notes xmlns:a="http://schemas.openxmlformats.org/drawingml/2006/main" xmlns:r="http://schemas.openxmlformats.org/officeDocument/2006/relationships" xmlns:p="http://schemas.openxmlformats.org/presentationml/2006/main">
   <p:cSld>
@@ -2452,12 +2848,20 @@
               <a:t> rámci </a:t>
             </a:r>
             <a:r>
-              <a:rPr lang="cs-CZ" baseline="0" dirty="0" err="1" smtClean="0"/>
-              <a:t>dipl</a:t>
-            </a:r>
-            <a:r>
               <a:rPr lang="cs-CZ" baseline="0" dirty="0" smtClean="0"/>
-              <a:t>. Práce jsem udělal rešerši existující podobná řešení.</a:t>
+              <a:t>diplomové práce </a:t>
+            </a:r>
+            <a:r>
+              <a:rPr lang="cs-CZ" baseline="0" dirty="0" smtClean="0"/>
+              <a:t>jsem udělal rešerši existující </a:t>
+            </a:r>
+            <a:r>
+              <a:rPr lang="cs-CZ" baseline="0" dirty="0" smtClean="0"/>
+              <a:t>podobných </a:t>
+            </a:r>
+            <a:r>
+              <a:rPr lang="cs-CZ" baseline="0" dirty="0" smtClean="0"/>
+              <a:t>řešení.</a:t>
             </a:r>
             <a:endParaRPr lang="cs-CZ" dirty="0"/>
           </a:p>
@@ -2674,7 +3078,15 @@
           <a:p>
             <a:r>
               <a:rPr lang="cs-CZ" dirty="0" smtClean="0"/>
-              <a:t>Výchozí stav že chyběla webová aplikace již</a:t>
+              <a:t>Výchozí </a:t>
+            </a:r>
+            <a:r>
+              <a:rPr lang="cs-CZ" dirty="0" smtClean="0"/>
+              <a:t>stav bylo že </a:t>
+            </a:r>
+            <a:r>
+              <a:rPr lang="cs-CZ" dirty="0" smtClean="0"/>
+              <a:t>chyběla webová aplikace již</a:t>
             </a:r>
             <a:r>
               <a:rPr lang="cs-CZ" baseline="0" dirty="0" smtClean="0"/>
@@ -3209,7 +3621,7 @@
           <a:p>
             <a:fld id="{4AAD347D-5ACD-4C99-B74B-A9C85AD731AF}" type="datetimeFigureOut">
               <a:rPr lang="en-US" dirty="0"/>
-              <a:t>6/9/2017</a:t>
+              <a:t>6/10/2017</a:t>
             </a:fld>
             <a:endParaRPr lang="en-US" dirty="0"/>
           </a:p>
@@ -3491,7 +3903,7 @@
           <a:p>
             <a:fld id="{4509A250-FF31-4206-8172-F9D3106AACB1}" type="datetimeFigureOut">
               <a:rPr lang="en-US" dirty="0"/>
-              <a:t>6/9/2017</a:t>
+              <a:t>6/10/2017</a:t>
             </a:fld>
             <a:endParaRPr lang="en-US" dirty="0"/>
           </a:p>
@@ -3692,7 +4104,7 @@
           <a:p>
             <a:fld id="{4509A250-FF31-4206-8172-F9D3106AACB1}" type="datetimeFigureOut">
               <a:rPr lang="en-US" dirty="0"/>
-              <a:t>6/9/2017</a:t>
+              <a:t>6/10/2017</a:t>
             </a:fld>
             <a:endParaRPr lang="en-US" dirty="0"/>
           </a:p>
@@ -3972,7 +4384,7 @@
           <a:p>
             <a:fld id="{4509A250-FF31-4206-8172-F9D3106AACB1}" type="datetimeFigureOut">
               <a:rPr lang="en-US" dirty="0"/>
-              <a:t>6/9/2017</a:t>
+              <a:t>6/10/2017</a:t>
             </a:fld>
             <a:endParaRPr lang="en-US" dirty="0"/>
           </a:p>
@@ -4320,7 +4732,7 @@
           <a:p>
             <a:fld id="{4509A250-FF31-4206-8172-F9D3106AACB1}" type="datetimeFigureOut">
               <a:rPr lang="en-US" dirty="0"/>
-              <a:t>6/9/2017</a:t>
+              <a:t>6/10/2017</a:t>
             </a:fld>
             <a:endParaRPr lang="en-US" dirty="0"/>
           </a:p>
@@ -4950,7 +5362,7 @@
           <a:p>
             <a:fld id="{4509A250-FF31-4206-8172-F9D3106AACB1}" type="datetimeFigureOut">
               <a:rPr lang="en-US" dirty="0"/>
-              <a:t>6/9/2017</a:t>
+              <a:t>6/10/2017</a:t>
             </a:fld>
             <a:endParaRPr lang="en-US" dirty="0"/>
           </a:p>
@@ -5817,7 +6229,7 @@
           <a:p>
             <a:fld id="{4509A250-FF31-4206-8172-F9D3106AACB1}" type="datetimeFigureOut">
               <a:rPr lang="en-US" dirty="0"/>
-              <a:t>6/9/2017</a:t>
+              <a:t>6/10/2017</a:t>
             </a:fld>
             <a:endParaRPr lang="en-US" dirty="0"/>
           </a:p>
@@ -5994,7 +6406,7 @@
           <a:p>
             <a:fld id="{4509A250-FF31-4206-8172-F9D3106AACB1}" type="datetimeFigureOut">
               <a:rPr lang="en-US" dirty="0"/>
-              <a:t>6/9/2017</a:t>
+              <a:t>6/10/2017</a:t>
             </a:fld>
             <a:endParaRPr lang="en-US" dirty="0"/>
           </a:p>
@@ -6181,7 +6593,7 @@
           <a:p>
             <a:fld id="{4509A250-FF31-4206-8172-F9D3106AACB1}" type="datetimeFigureOut">
               <a:rPr lang="en-US" dirty="0"/>
-              <a:t>6/9/2017</a:t>
+              <a:t>6/10/2017</a:t>
             </a:fld>
             <a:endParaRPr lang="en-US" dirty="0"/>
           </a:p>
@@ -6358,7 +6770,7 @@
           <a:p>
             <a:fld id="{4509A250-FF31-4206-8172-F9D3106AACB1}" type="datetimeFigureOut">
               <a:rPr lang="en-US" dirty="0"/>
-              <a:t>6/9/2017</a:t>
+              <a:t>6/10/2017</a:t>
             </a:fld>
             <a:endParaRPr lang="en-US" dirty="0"/>
           </a:p>
@@ -6612,7 +7024,7 @@
           <a:p>
             <a:fld id="{9796027F-7875-4030-9381-8BD8C4F21935}" type="datetimeFigureOut">
               <a:rPr lang="en-US" dirty="0"/>
-              <a:t>6/9/2017</a:t>
+              <a:t>6/10/2017</a:t>
             </a:fld>
             <a:endParaRPr lang="en-US" dirty="0"/>
           </a:p>
@@ -6911,7 +7323,7 @@
           <a:p>
             <a:fld id="{9796027F-7875-4030-9381-8BD8C4F21935}" type="datetimeFigureOut">
               <a:rPr lang="en-US" dirty="0"/>
-              <a:t>6/9/2017</a:t>
+              <a:t>6/10/2017</a:t>
             </a:fld>
             <a:endParaRPr lang="en-US" dirty="0"/>
           </a:p>
@@ -7362,7 +7774,7 @@
           <a:p>
             <a:fld id="{9796027F-7875-4030-9381-8BD8C4F21935}" type="datetimeFigureOut">
               <a:rPr lang="en-US" dirty="0"/>
-              <a:t>6/9/2017</a:t>
+              <a:t>6/10/2017</a:t>
             </a:fld>
             <a:endParaRPr lang="en-US" dirty="0"/>
           </a:p>
@@ -7487,7 +7899,7 @@
           <a:p>
             <a:fld id="{4509A250-FF31-4206-8172-F9D3106AACB1}" type="datetimeFigureOut">
               <a:rPr lang="en-US" dirty="0"/>
-              <a:t>6/9/2017</a:t>
+              <a:t>6/10/2017</a:t>
             </a:fld>
             <a:endParaRPr lang="en-US" dirty="0"/>
           </a:p>
@@ -7589,7 +8001,7 @@
           <a:p>
             <a:fld id="{4509A250-FF31-4206-8172-F9D3106AACB1}" type="datetimeFigureOut">
               <a:rPr lang="en-US" dirty="0"/>
-              <a:t>6/9/2017</a:t>
+              <a:t>6/10/2017</a:t>
             </a:fld>
             <a:endParaRPr lang="en-US" dirty="0"/>
           </a:p>
@@ -7875,7 +8287,7 @@
           <a:p>
             <a:fld id="{4509A250-FF31-4206-8172-F9D3106AACB1}" type="datetimeFigureOut">
               <a:rPr lang="en-US" dirty="0"/>
-              <a:t>6/9/2017</a:t>
+              <a:t>6/10/2017</a:t>
             </a:fld>
             <a:endParaRPr lang="en-US" dirty="0"/>
           </a:p>
@@ -8157,7 +8569,7 @@
           <a:p>
             <a:fld id="{4509A250-FF31-4206-8172-F9D3106AACB1}" type="datetimeFigureOut">
               <a:rPr lang="en-US" dirty="0"/>
-              <a:t>6/9/2017</a:t>
+              <a:t>6/10/2017</a:t>
             </a:fld>
             <a:endParaRPr lang="en-US" dirty="0"/>
           </a:p>
@@ -8593,7 +9005,7 @@
           <a:p>
             <a:fld id="{4AAD347D-5ACD-4C99-B74B-A9C85AD731AF}" type="datetimeFigureOut">
               <a:rPr lang="en-US" dirty="0"/>
-              <a:t>6/9/2017</a:t>
+              <a:t>6/10/2017</a:t>
             </a:fld>
             <a:endParaRPr lang="en-US" dirty="0"/>
           </a:p>
@@ -9258,11 +9670,11 @@
   <p:clrMapOvr>
     <a:masterClrMapping/>
   </p:clrMapOvr>
-  <mc:AlternateContent xmlns:mc="http://schemas.openxmlformats.org/markup-compatibility/2006" xmlns:p14="http://schemas.microsoft.com/office/powerpoint/2010/main">
-    <mc:Choice Requires="p14">
+  <mc:AlternateContent xmlns:mc="http://schemas.openxmlformats.org/markup-compatibility/2006">
+    <mc:Choice xmlns:p14="http://schemas.microsoft.com/office/powerpoint/2010/main" Requires="p14">
       <p:transition p14:dur="0"/>
     </mc:Choice>
-    <mc:Fallback xmlns="">
+    <mc:Fallback>
       <p:transition/>
     </mc:Fallback>
   </mc:AlternateContent>
@@ -9370,11 +9782,7 @@
           <a:p>
             <a:r>
               <a:rPr lang="cs-CZ" dirty="0" smtClean="0"/>
-              <a:t>Import </a:t>
-            </a:r>
-            <a:r>
-              <a:rPr lang="cs-CZ" dirty="0" smtClean="0"/>
-              <a:t>dat ze zařízení</a:t>
+              <a:t>Import dat ze zařízení</a:t>
             </a:r>
           </a:p>
           <a:p>
@@ -9468,11 +9876,11 @@
   <p:clrMapOvr>
     <a:masterClrMapping/>
   </p:clrMapOvr>
-  <mc:AlternateContent xmlns:mc="http://schemas.openxmlformats.org/markup-compatibility/2006" xmlns:p14="http://schemas.microsoft.com/office/powerpoint/2010/main">
-    <mc:Choice Requires="p14">
+  <mc:AlternateContent xmlns:mc="http://schemas.openxmlformats.org/markup-compatibility/2006">
+    <mc:Choice xmlns:p14="http://schemas.microsoft.com/office/powerpoint/2010/main" Requires="p14">
       <p:transition p14:dur="0"/>
     </mc:Choice>
-    <mc:Fallback xmlns="">
+    <mc:Fallback>
       <p:transition/>
     </mc:Fallback>
   </mc:AlternateContent>
@@ -9622,18 +10030,7 @@
                   </a:schemeClr>
                 </a:solidFill>
               </a:rPr>
-              <a:t>Import </a:t>
-            </a:r>
-            <a:r>
-              <a:rPr lang="cs-CZ" b="1" dirty="0" smtClean="0">
-                <a:solidFill>
-                  <a:schemeClr val="accent3">
-                    <a:lumMod val="60000"/>
-                    <a:lumOff val="40000"/>
-                  </a:schemeClr>
-                </a:solidFill>
-              </a:rPr>
-              <a:t>dat ze zařízení</a:t>
+              <a:t>Import dat ze zařízení</a:t>
             </a:r>
           </a:p>
           <a:p>
@@ -9776,11 +10173,11 @@
   <p:clrMapOvr>
     <a:masterClrMapping/>
   </p:clrMapOvr>
-  <mc:AlternateContent xmlns:mc="http://schemas.openxmlformats.org/markup-compatibility/2006" xmlns:p14="http://schemas.microsoft.com/office/powerpoint/2010/main">
-    <mc:Choice Requires="p14">
+  <mc:AlternateContent xmlns:mc="http://schemas.openxmlformats.org/markup-compatibility/2006">
+    <mc:Choice xmlns:p14="http://schemas.microsoft.com/office/powerpoint/2010/main" Requires="p14">
       <p:transition p14:dur="0"/>
     </mc:Choice>
-    <mc:Fallback xmlns="">
+    <mc:Fallback>
       <p:transition/>
     </mc:Fallback>
   </mc:AlternateContent>
@@ -9846,60 +10243,80 @@
         </p:nvSpPr>
         <p:spPr/>
         <p:txBody>
-          <a:bodyPr/>
+          <a:bodyPr>
+            <a:normAutofit/>
+          </a:bodyPr>
           <a:lstStyle/>
           <a:p>
-            <a:r>
-              <a:rPr lang="cs-CZ" dirty="0" smtClean="0"/>
+            <a:pPr>
+              <a:lnSpc>
+                <a:spcPct val="150000"/>
+              </a:lnSpc>
+            </a:pPr>
+            <a:r>
+              <a:rPr lang="cs-CZ" sz="2400" dirty="0" smtClean="0"/>
               <a:t>Komplexní grafy </a:t>
             </a:r>
             <a:r>
-              <a:rPr lang="cs-CZ" dirty="0"/>
+              <a:rPr lang="cs-CZ" sz="2400" dirty="0"/>
               <a:t>a tabulky pro </a:t>
             </a:r>
             <a:r>
-              <a:rPr lang="cs-CZ" dirty="0" smtClean="0"/>
+              <a:rPr lang="cs-CZ" sz="2400" dirty="0" smtClean="0"/>
               <a:t>porovnaní souvislostí </a:t>
             </a:r>
             <a:r>
-              <a:rPr lang="cs-CZ" dirty="0"/>
+              <a:rPr lang="cs-CZ" sz="2400" dirty="0"/>
               <a:t>mezi </a:t>
             </a:r>
             <a:r>
-              <a:rPr lang="cs-CZ" dirty="0" smtClean="0"/>
+              <a:rPr lang="cs-CZ" sz="2400" dirty="0" smtClean="0"/>
               <a:t>sledovanými parametry </a:t>
             </a:r>
             <a:r>
-              <a:rPr lang="cs-CZ" dirty="0"/>
-              <a:t>v case</a:t>
-            </a:r>
-            <a:endParaRPr lang="cs-CZ" dirty="0"/>
-          </a:p>
-          <a:p>
-            <a:r>
-              <a:rPr lang="cs-CZ" dirty="0" smtClean="0"/>
+              <a:rPr lang="cs-CZ" sz="2400" dirty="0"/>
+              <a:t>v </a:t>
+            </a:r>
+            <a:r>
+              <a:rPr lang="cs-CZ" sz="2400" dirty="0" smtClean="0"/>
+              <a:t>čase</a:t>
+            </a:r>
+            <a:endParaRPr lang="cs-CZ" sz="2400" dirty="0"/>
+          </a:p>
+          <a:p>
+            <a:pPr>
+              <a:lnSpc>
+                <a:spcPct val="150000"/>
+              </a:lnSpc>
+            </a:pPr>
+            <a:r>
+              <a:rPr lang="cs-CZ" sz="2400" dirty="0" smtClean="0"/>
               <a:t>Glykemické profily</a:t>
             </a:r>
-            <a:endParaRPr lang="cs-CZ" dirty="0"/>
-          </a:p>
-          <a:p>
-            <a:r>
-              <a:rPr lang="cs-CZ" dirty="0" smtClean="0"/>
+            <a:endParaRPr lang="cs-CZ" sz="2400" dirty="0"/>
+          </a:p>
+          <a:p>
+            <a:pPr>
+              <a:lnSpc>
+                <a:spcPct val="150000"/>
+              </a:lnSpc>
+            </a:pPr>
+            <a:r>
+              <a:rPr lang="cs-CZ" sz="2400" dirty="0" smtClean="0"/>
               <a:t>Import </a:t>
             </a:r>
             <a:r>
-              <a:rPr lang="cs-CZ" dirty="0"/>
+              <a:rPr lang="cs-CZ" sz="2400" dirty="0"/>
               <a:t>a export souboru </a:t>
             </a:r>
             <a:r>
-              <a:rPr lang="cs-CZ" dirty="0" smtClean="0"/>
+              <a:rPr lang="cs-CZ" sz="2400" dirty="0" smtClean="0"/>
               <a:t>naměřených </a:t>
             </a:r>
             <a:r>
-              <a:rPr lang="cs-CZ" dirty="0"/>
+              <a:rPr lang="cs-CZ" sz="2400" dirty="0"/>
               <a:t>dat</a:t>
             </a:r>
-            <a:endParaRPr lang="cs-CZ" dirty="0"/>
           </a:p>
         </p:txBody>
       </p:sp>
@@ -9913,16 +10330,12 @@
   <p:clrMapOvr>
     <a:masterClrMapping/>
   </p:clrMapOvr>
-  <mc:AlternateContent xmlns:mc="http://schemas.openxmlformats.org/markup-compatibility/2006" xmlns:p14="http://schemas.microsoft.com/office/powerpoint/2010/main">
-    <mc:Choice Requires="p14">
-      <p:transition spd="slow" p14:dur="1250">
-        <p:pull/>
-      </p:transition>
+  <mc:AlternateContent xmlns:mc="http://schemas.openxmlformats.org/markup-compatibility/2006">
+    <mc:Choice xmlns:p14="http://schemas.microsoft.com/office/powerpoint/2010/main" Requires="p14">
+      <p:transition p14:dur="0"/>
     </mc:Choice>
-    <mc:Fallback xmlns="">
-      <p:transition spd="slow">
-        <p:pull/>
-      </p:transition>
+    <mc:Fallback>
+      <p:transition/>
     </mc:Fallback>
   </mc:AlternateContent>
 </p:sld>
@@ -10035,11 +10448,11 @@
   <p:clrMapOvr>
     <a:masterClrMapping/>
   </p:clrMapOvr>
-  <mc:AlternateContent xmlns:mc="http://schemas.openxmlformats.org/markup-compatibility/2006" xmlns:p14="http://schemas.microsoft.com/office/powerpoint/2010/main">
-    <mc:Choice Requires="p14">
+  <mc:AlternateContent xmlns:mc="http://schemas.openxmlformats.org/markup-compatibility/2006">
+    <mc:Choice xmlns:p14="http://schemas.microsoft.com/office/powerpoint/2010/main" Requires="p14">
       <p:transition p14:dur="0"/>
     </mc:Choice>
-    <mc:Fallback xmlns="">
+    <mc:Fallback>
       <p:transition/>
     </mc:Fallback>
   </mc:AlternateContent>
@@ -10113,26 +10526,43 @@
         </p:nvSpPr>
         <p:spPr/>
         <p:txBody>
-          <a:bodyPr/>
+          <a:bodyPr>
+            <a:normAutofit/>
+          </a:bodyPr>
           <a:lstStyle/>
           <a:p>
-            <a:r>
-              <a:rPr lang="cs-CZ" dirty="0" smtClean="0"/>
+            <a:pPr>
+              <a:lnSpc>
+                <a:spcPct val="150000"/>
+              </a:lnSpc>
+            </a:pPr>
+            <a:r>
+              <a:rPr lang="cs-CZ" sz="2400" dirty="0" smtClean="0"/>
               <a:t>Správa pacientů a pacientských skupin</a:t>
             </a:r>
           </a:p>
           <a:p>
-            <a:r>
-              <a:rPr lang="cs-CZ" dirty="0" smtClean="0"/>
+            <a:pPr>
+              <a:lnSpc>
+                <a:spcPct val="150000"/>
+              </a:lnSpc>
+            </a:pPr>
+            <a:r>
+              <a:rPr lang="cs-CZ" sz="2400" dirty="0" smtClean="0"/>
               <a:t>Správa uživatelů a přístupů</a:t>
             </a:r>
           </a:p>
           <a:p>
-            <a:r>
-              <a:rPr lang="cs-CZ" dirty="0" smtClean="0"/>
+            <a:pPr>
+              <a:lnSpc>
+                <a:spcPct val="150000"/>
+              </a:lnSpc>
+            </a:pPr>
+            <a:r>
+              <a:rPr lang="cs-CZ" sz="2400" dirty="0" smtClean="0"/>
               <a:t>Správa a přiřazení zařízení</a:t>
             </a:r>
-            <a:endParaRPr lang="cs-CZ" dirty="0"/>
+            <a:endParaRPr lang="cs-CZ" sz="2400" dirty="0"/>
           </a:p>
         </p:txBody>
       </p:sp>
@@ -10146,16 +10576,12 @@
   <p:clrMapOvr>
     <a:masterClrMapping/>
   </p:clrMapOvr>
-  <mc:AlternateContent xmlns:mc="http://schemas.openxmlformats.org/markup-compatibility/2006" xmlns:p14="http://schemas.microsoft.com/office/powerpoint/2010/main">
-    <mc:Choice Requires="p14">
-      <p:transition spd="slow" p14:dur="1250">
-        <p:pull/>
-      </p:transition>
+  <mc:AlternateContent xmlns:mc="http://schemas.openxmlformats.org/markup-compatibility/2006">
+    <mc:Choice xmlns:p14="http://schemas.microsoft.com/office/powerpoint/2010/main" Requires="p14">
+      <p:transition p14:dur="0"/>
     </mc:Choice>
-    <mc:Fallback xmlns="">
-      <p:transition spd="slow">
-        <p:pull/>
-      </p:transition>
+    <mc:Fallback>
+      <p:transition/>
     </mc:Fallback>
   </mc:AlternateContent>
 </p:sld>
@@ -10240,11 +10666,11 @@
   <p:clrMapOvr>
     <a:masterClrMapping/>
   </p:clrMapOvr>
-  <mc:AlternateContent xmlns:mc="http://schemas.openxmlformats.org/markup-compatibility/2006" xmlns:p14="http://schemas.microsoft.com/office/powerpoint/2010/main">
-    <mc:Choice Requires="p14">
+  <mc:AlternateContent xmlns:mc="http://schemas.openxmlformats.org/markup-compatibility/2006">
+    <mc:Choice xmlns:p14="http://schemas.microsoft.com/office/powerpoint/2010/main" Requires="p14">
       <p:transition p14:dur="0"/>
     </mc:Choice>
-    <mc:Fallback xmlns="">
+    <mc:Fallback>
       <p:transition/>
     </mc:Fallback>
   </mc:AlternateContent>
@@ -10460,11 +10886,11 @@
   <p:clrMapOvr>
     <a:masterClrMapping/>
   </p:clrMapOvr>
-  <mc:AlternateContent xmlns:mc="http://schemas.openxmlformats.org/markup-compatibility/2006" xmlns:p14="http://schemas.microsoft.com/office/powerpoint/2010/main">
-    <mc:Choice Requires="p14">
+  <mc:AlternateContent xmlns:mc="http://schemas.openxmlformats.org/markup-compatibility/2006">
+    <mc:Choice xmlns:p14="http://schemas.microsoft.com/office/powerpoint/2010/main" Requires="p14">
       <p:transition p14:dur="0"/>
     </mc:Choice>
-    <mc:Fallback xmlns="">
+    <mc:Fallback>
       <p:transition/>
     </mc:Fallback>
   </mc:AlternateContent>
@@ -10495,31 +10921,9 @@
           <a:chExt cx="0" cy="0"/>
         </a:xfrm>
       </p:grpSpPr>
-      <p:sp>
-        <p:nvSpPr>
-          <p:cNvPr id="2" name="Nadpis 1"/>
-          <p:cNvSpPr>
-            <a:spLocks noGrp="1"/>
-          </p:cNvSpPr>
-          <p:nvPr>
-            <p:ph type="title"/>
-          </p:nvPr>
-        </p:nvSpPr>
-        <p:spPr/>
-        <p:txBody>
-          <a:bodyPr/>
-          <a:lstStyle/>
-          <a:p>
-            <a:r>
-              <a:rPr lang="cs-CZ" dirty="0"/>
-              <a:t>Jídelní situace</a:t>
-            </a:r>
-          </a:p>
-        </p:txBody>
-      </p:sp>
       <p:pic>
         <p:nvPicPr>
-          <p:cNvPr id="4" name="Zástupný symbol pro obsah 3"/>
+          <p:cNvPr id="5" name="Zástupný symbol pro obsah 4"/>
           <p:cNvPicPr>
             <a:picLocks noGrp="1" noChangeAspect="1"/>
           </p:cNvPicPr>
@@ -10535,8 +10939,8 @@
         </p:blipFill>
         <p:spPr>
           <a:xfrm>
-            <a:off x="-22606" y="2588821"/>
-            <a:ext cx="12214605" cy="2464210"/>
+            <a:off x="0" y="2593382"/>
+            <a:ext cx="12191999" cy="2459649"/>
           </a:xfrm>
           <a:prstGeom prst="rect">
             <a:avLst/>
@@ -10546,21 +10950,43 @@
           </a:solidFill>
         </p:spPr>
       </p:pic>
+      <p:sp>
+        <p:nvSpPr>
+          <p:cNvPr id="2" name="Nadpis 1"/>
+          <p:cNvSpPr>
+            <a:spLocks noGrp="1"/>
+          </p:cNvSpPr>
+          <p:nvPr>
+            <p:ph type="title"/>
+          </p:nvPr>
+        </p:nvSpPr>
+        <p:spPr/>
+        <p:txBody>
+          <a:bodyPr/>
+          <a:lstStyle/>
+          <a:p>
+            <a:r>
+              <a:rPr lang="cs-CZ" dirty="0"/>
+              <a:t>Jídelní situace</a:t>
+            </a:r>
+          </a:p>
+        </p:txBody>
+      </p:sp>
     </p:spTree>
     <p:extLst>
       <p:ext uri="{BB962C8B-B14F-4D97-AF65-F5344CB8AC3E}">
-        <p14:creationId xmlns:p14="http://schemas.microsoft.com/office/powerpoint/2010/main" val="2573221461"/>
+        <p14:creationId xmlns:p14="http://schemas.microsoft.com/office/powerpoint/2010/main" val="1799665361"/>
       </p:ext>
     </p:extLst>
   </p:cSld>
   <p:clrMapOvr>
     <a:masterClrMapping/>
   </p:clrMapOvr>
-  <mc:AlternateContent xmlns:mc="http://schemas.openxmlformats.org/markup-compatibility/2006" xmlns:p14="http://schemas.microsoft.com/office/powerpoint/2010/main">
-    <mc:Choice Requires="p14">
+  <mc:AlternateContent xmlns:mc="http://schemas.openxmlformats.org/markup-compatibility/2006">
+    <mc:Choice xmlns:p14="http://schemas.microsoft.com/office/powerpoint/2010/main" Requires="p14">
       <p:transition p14:dur="0"/>
     </mc:Choice>
-    <mc:Fallback xmlns="">
+    <mc:Fallback>
       <p:transition/>
     </mc:Fallback>
   </mc:AlternateContent>
@@ -10591,31 +11017,9 @@
           <a:chExt cx="0" cy="0"/>
         </a:xfrm>
       </p:grpSpPr>
-      <p:sp>
-        <p:nvSpPr>
-          <p:cNvPr id="2" name="Nadpis 1"/>
-          <p:cNvSpPr>
-            <a:spLocks noGrp="1"/>
-          </p:cNvSpPr>
-          <p:nvPr>
-            <p:ph type="title"/>
-          </p:nvPr>
-        </p:nvSpPr>
-        <p:spPr/>
-        <p:txBody>
-          <a:bodyPr/>
-          <a:lstStyle/>
-          <a:p>
-            <a:r>
-              <a:rPr lang="cs-CZ" dirty="0"/>
-              <a:t>Jídelní situace</a:t>
-            </a:r>
-          </a:p>
-        </p:txBody>
-      </p:sp>
       <p:pic>
         <p:nvPicPr>
-          <p:cNvPr id="4" name="Zástupný symbol pro obsah 3"/>
+          <p:cNvPr id="5" name="Zástupný symbol pro obsah 4"/>
           <p:cNvPicPr>
             <a:picLocks noGrp="1" noChangeAspect="1"/>
           </p:cNvPicPr>
@@ -10631,8 +11035,8 @@
         </p:blipFill>
         <p:spPr>
           <a:xfrm>
-            <a:off x="-22606" y="2588821"/>
-            <a:ext cx="12214605" cy="2464210"/>
+            <a:off x="0" y="2593382"/>
+            <a:ext cx="12191999" cy="2459649"/>
           </a:xfrm>
           <a:prstGeom prst="rect">
             <a:avLst/>
@@ -10642,6 +11046,28 @@
           </a:solidFill>
         </p:spPr>
       </p:pic>
+      <p:sp>
+        <p:nvSpPr>
+          <p:cNvPr id="2" name="Nadpis 1"/>
+          <p:cNvSpPr>
+            <a:spLocks noGrp="1"/>
+          </p:cNvSpPr>
+          <p:nvPr>
+            <p:ph type="title"/>
+          </p:nvPr>
+        </p:nvSpPr>
+        <p:spPr/>
+        <p:txBody>
+          <a:bodyPr/>
+          <a:lstStyle/>
+          <a:p>
+            <a:r>
+              <a:rPr lang="cs-CZ" dirty="0"/>
+              <a:t>Jídelní situace</a:t>
+            </a:r>
+          </a:p>
+        </p:txBody>
+      </p:sp>
       <p:grpSp>
         <p:nvGrpSpPr>
           <p:cNvPr id="11" name="Skupina 10"/>
@@ -10737,18 +11163,18 @@
     </p:spTree>
     <p:extLst>
       <p:ext uri="{BB962C8B-B14F-4D97-AF65-F5344CB8AC3E}">
-        <p14:creationId xmlns:p14="http://schemas.microsoft.com/office/powerpoint/2010/main" val="1799665361"/>
+        <p14:creationId xmlns:p14="http://schemas.microsoft.com/office/powerpoint/2010/main" val="4294800151"/>
       </p:ext>
     </p:extLst>
   </p:cSld>
   <p:clrMapOvr>
     <a:masterClrMapping/>
   </p:clrMapOvr>
-  <mc:AlternateContent xmlns:mc="http://schemas.openxmlformats.org/markup-compatibility/2006" xmlns:p14="http://schemas.microsoft.com/office/powerpoint/2010/main">
-    <mc:Choice Requires="p14">
+  <mc:AlternateContent xmlns:mc="http://schemas.openxmlformats.org/markup-compatibility/2006">
+    <mc:Choice xmlns:p14="http://schemas.microsoft.com/office/powerpoint/2010/main" Requires="p14">
       <p:transition p14:dur="0"/>
     </mc:Choice>
-    <mc:Fallback xmlns="">
+    <mc:Fallback>
       <p:transition/>
     </mc:Fallback>
   </mc:AlternateContent>
@@ -10840,11 +11266,11 @@
   <p:clrMapOvr>
     <a:masterClrMapping/>
   </p:clrMapOvr>
-  <mc:AlternateContent xmlns:mc="http://schemas.openxmlformats.org/markup-compatibility/2006" xmlns:p14="http://schemas.microsoft.com/office/powerpoint/2010/main">
-    <mc:Choice Requires="p14">
+  <mc:AlternateContent xmlns:mc="http://schemas.openxmlformats.org/markup-compatibility/2006">
+    <mc:Choice xmlns:p14="http://schemas.microsoft.com/office/powerpoint/2010/main" Requires="p14">
       <p:transition p14:dur="0"/>
     </mc:Choice>
-    <mc:Fallback xmlns="">
+    <mc:Fallback>
       <p:transition/>
     </mc:Fallback>
   </mc:AlternateContent>
@@ -10982,11 +11408,11 @@
   <p:clrMapOvr>
     <a:masterClrMapping/>
   </p:clrMapOvr>
-  <mc:AlternateContent xmlns:mc="http://schemas.openxmlformats.org/markup-compatibility/2006" xmlns:p14="http://schemas.microsoft.com/office/powerpoint/2010/main">
-    <mc:Choice Requires="p14">
+  <mc:AlternateContent xmlns:mc="http://schemas.openxmlformats.org/markup-compatibility/2006">
+    <mc:Choice xmlns:p14="http://schemas.microsoft.com/office/powerpoint/2010/main" Requires="p14">
       <p:transition p14:dur="0"/>
     </mc:Choice>
-    <mc:Fallback xmlns="">
+    <mc:Fallback>
       <p:transition/>
     </mc:Fallback>
   </mc:AlternateContent>
@@ -11078,11 +11504,11 @@
   <p:clrMapOvr>
     <a:masterClrMapping/>
   </p:clrMapOvr>
-  <mc:AlternateContent xmlns:mc="http://schemas.openxmlformats.org/markup-compatibility/2006" xmlns:p14="http://schemas.microsoft.com/office/powerpoint/2010/main">
-    <mc:Choice Requires="p14">
+  <mc:AlternateContent xmlns:mc="http://schemas.openxmlformats.org/markup-compatibility/2006">
+    <mc:Choice xmlns:p14="http://schemas.microsoft.com/office/powerpoint/2010/main" Requires="p14">
       <p:transition p14:dur="0"/>
     </mc:Choice>
-    <mc:Fallback xmlns="">
+    <mc:Fallback>
       <p:transition/>
     </mc:Fallback>
   </mc:AlternateContent>
@@ -11266,11 +11692,11 @@
   <p:clrMapOvr>
     <a:masterClrMapping/>
   </p:clrMapOvr>
-  <mc:AlternateContent xmlns:mc="http://schemas.openxmlformats.org/markup-compatibility/2006" xmlns:p14="http://schemas.microsoft.com/office/powerpoint/2010/main">
-    <mc:Choice Requires="p14">
+  <mc:AlternateContent xmlns:mc="http://schemas.openxmlformats.org/markup-compatibility/2006">
+    <mc:Choice xmlns:p14="http://schemas.microsoft.com/office/powerpoint/2010/main" Requires="p14">
       <p:transition p14:dur="0"/>
     </mc:Choice>
-    <mc:Fallback xmlns="">
+    <mc:Fallback>
       <p:transition/>
     </mc:Fallback>
   </mc:AlternateContent>
@@ -11365,11 +11791,11 @@
   <p:clrMapOvr>
     <a:masterClrMapping/>
   </p:clrMapOvr>
-  <mc:AlternateContent xmlns:mc="http://schemas.openxmlformats.org/markup-compatibility/2006" xmlns:p14="http://schemas.microsoft.com/office/powerpoint/2010/main">
-    <mc:Choice Requires="p14">
+  <mc:AlternateContent xmlns:mc="http://schemas.openxmlformats.org/markup-compatibility/2006">
+    <mc:Choice xmlns:p14="http://schemas.microsoft.com/office/powerpoint/2010/main" Requires="p14">
       <p:transition p14:dur="0"/>
     </mc:Choice>
-    <mc:Fallback xmlns="">
+    <mc:Fallback>
       <p:transition/>
     </mc:Fallback>
   </mc:AlternateContent>
@@ -11522,11 +11948,11 @@
   <p:clrMapOvr>
     <a:masterClrMapping/>
   </p:clrMapOvr>
-  <mc:AlternateContent xmlns:mc="http://schemas.openxmlformats.org/markup-compatibility/2006" xmlns:p14="http://schemas.microsoft.com/office/powerpoint/2010/main">
-    <mc:Choice Requires="p14">
+  <mc:AlternateContent xmlns:mc="http://schemas.openxmlformats.org/markup-compatibility/2006">
+    <mc:Choice xmlns:p14="http://schemas.microsoft.com/office/powerpoint/2010/main" Requires="p14">
       <p:transition p14:dur="0"/>
     </mc:Choice>
-    <mc:Fallback xmlns="">
+    <mc:Fallback>
       <p:transition/>
     </mc:Fallback>
   </mc:AlternateContent>
@@ -11595,34 +12021,54 @@
           <a:bodyPr/>
           <a:lstStyle/>
           <a:p>
-            <a:r>
-              <a:rPr lang="cs-CZ" dirty="0" smtClean="0"/>
+            <a:pPr>
+              <a:lnSpc>
+                <a:spcPct val="150000"/>
+              </a:lnSpc>
+            </a:pPr>
+            <a:r>
+              <a:rPr lang="cs-CZ" sz="2400" dirty="0" smtClean="0"/>
               <a:t>Samotná implementace má cca 8 000 řádků kódu</a:t>
             </a:r>
           </a:p>
           <a:p>
-            <a:r>
-              <a:rPr lang="cs-CZ" dirty="0" smtClean="0"/>
+            <a:pPr>
+              <a:lnSpc>
+                <a:spcPct val="150000"/>
+              </a:lnSpc>
+            </a:pPr>
+            <a:r>
+              <a:rPr lang="cs-CZ" sz="2400" dirty="0" smtClean="0"/>
               <a:t>Jedná se cca 90 souborů</a:t>
             </a:r>
           </a:p>
           <a:p>
-            <a:r>
-              <a:rPr lang="cs-CZ" dirty="0" smtClean="0"/>
+            <a:pPr>
+              <a:lnSpc>
+                <a:spcPct val="150000"/>
+              </a:lnSpc>
+            </a:pPr>
+            <a:r>
+              <a:rPr lang="cs-CZ" sz="2400" dirty="0" smtClean="0"/>
               <a:t>Bylo implementováno cca 500 tříd a metod</a:t>
             </a:r>
           </a:p>
           <a:p>
-            <a:r>
-              <a:rPr lang="cs-CZ" dirty="0" smtClean="0"/>
+            <a:pPr>
+              <a:lnSpc>
+                <a:spcPct val="150000"/>
+              </a:lnSpc>
+            </a:pPr>
+            <a:r>
+              <a:rPr lang="cs-CZ" sz="2400" dirty="0" smtClean="0"/>
               <a:t>Bylo provedeno více než 200 </a:t>
             </a:r>
             <a:r>
-              <a:rPr lang="cs-CZ" dirty="0" err="1" smtClean="0"/>
+              <a:rPr lang="cs-CZ" sz="2400" dirty="0" err="1" smtClean="0"/>
               <a:t>commitů</a:t>
             </a:r>
             <a:r>
-              <a:rPr lang="cs-CZ" dirty="0" smtClean="0"/>
+              <a:rPr lang="cs-CZ" sz="2400" dirty="0" smtClean="0"/>
               <a:t> kódu</a:t>
             </a:r>
           </a:p>
@@ -11644,16 +12090,12 @@
   <p:clrMapOvr>
     <a:masterClrMapping/>
   </p:clrMapOvr>
-  <mc:AlternateContent xmlns:mc="http://schemas.openxmlformats.org/markup-compatibility/2006" xmlns:p14="http://schemas.microsoft.com/office/powerpoint/2010/main">
-    <mc:Choice Requires="p14">
-      <p:transition spd="slow" p14:dur="1250">
-        <p:pull/>
-      </p:transition>
+  <mc:AlternateContent xmlns:mc="http://schemas.openxmlformats.org/markup-compatibility/2006">
+    <mc:Choice xmlns:p14="http://schemas.microsoft.com/office/powerpoint/2010/main" Requires="p14">
+      <p:transition p14:dur="0"/>
     </mc:Choice>
-    <mc:Fallback xmlns="">
-      <p:transition spd="slow">
-        <p:pull/>
-      </p:transition>
+    <mc:Fallback>
+      <p:transition/>
     </mc:Fallback>
   </mc:AlternateContent>
 </p:sld>
@@ -11783,11 +12225,11 @@
   <p:clrMapOvr>
     <a:masterClrMapping/>
   </p:clrMapOvr>
-  <mc:AlternateContent xmlns:mc="http://schemas.openxmlformats.org/markup-compatibility/2006" xmlns:p14="http://schemas.microsoft.com/office/powerpoint/2010/main">
-    <mc:Choice Requires="p14">
+  <mc:AlternateContent xmlns:mc="http://schemas.openxmlformats.org/markup-compatibility/2006">
+    <mc:Choice xmlns:p14="http://schemas.microsoft.com/office/powerpoint/2010/main" Requires="p14">
       <p:transition p14:dur="0"/>
     </mc:Choice>
-    <mc:Fallback xmlns="">
+    <mc:Fallback>
       <p:transition/>
     </mc:Fallback>
   </mc:AlternateContent>
@@ -11995,11 +12437,11 @@
   <p:clrMapOvr>
     <a:masterClrMapping/>
   </p:clrMapOvr>
-  <mc:AlternateContent xmlns:mc="http://schemas.openxmlformats.org/markup-compatibility/2006" xmlns:p14="http://schemas.microsoft.com/office/powerpoint/2010/main">
-    <mc:Choice Requires="p14">
+  <mc:AlternateContent xmlns:mc="http://schemas.openxmlformats.org/markup-compatibility/2006">
+    <mc:Choice xmlns:p14="http://schemas.microsoft.com/office/powerpoint/2010/main" Requires="p14">
       <p:transition p14:dur="0"/>
     </mc:Choice>
-    <mc:Fallback xmlns="">
+    <mc:Fallback>
       <p:transition/>
     </mc:Fallback>
   </mc:AlternateContent>
@@ -12075,6 +12517,11 @@
           </a:bodyPr>
           <a:lstStyle/>
           <a:p>
+            <a:pPr>
+              <a:lnSpc>
+                <a:spcPct val="150000"/>
+              </a:lnSpc>
+            </a:pPr>
             <a:r>
               <a:rPr lang="cs-CZ" sz="2400" dirty="0"/>
               <a:t>Jakým způsobem je řešeno bezpečné ukládání hesel v DB? Jak jsou </a:t>
@@ -12089,6 +12536,11 @@
             </a:r>
           </a:p>
           <a:p>
+            <a:pPr>
+              <a:lnSpc>
+                <a:spcPct val="150000"/>
+              </a:lnSpc>
+            </a:pPr>
             <a:r>
               <a:rPr lang="cs-CZ" sz="2400" dirty="0" smtClean="0"/>
               <a:t>Proč </a:t>
@@ -12099,6 +12551,11 @@
             </a:r>
           </a:p>
           <a:p>
+            <a:pPr>
+              <a:lnSpc>
+                <a:spcPct val="150000"/>
+              </a:lnSpc>
+            </a:pPr>
             <a:r>
               <a:rPr lang="cs-CZ" sz="2400" dirty="0" smtClean="0"/>
               <a:t>Oproti původní </a:t>
@@ -12141,11 +12598,11 @@
   <p:clrMapOvr>
     <a:masterClrMapping/>
   </p:clrMapOvr>
-  <mc:AlternateContent xmlns:mc="http://schemas.openxmlformats.org/markup-compatibility/2006" xmlns:p14="http://schemas.microsoft.com/office/powerpoint/2010/main">
-    <mc:Choice Requires="p14">
+  <mc:AlternateContent xmlns:mc="http://schemas.openxmlformats.org/markup-compatibility/2006">
+    <mc:Choice xmlns:p14="http://schemas.microsoft.com/office/powerpoint/2010/main" Requires="p14">
       <p:transition p14:dur="0"/>
     </mc:Choice>
-    <mc:Fallback xmlns="">
+    <mc:Fallback>
       <p:transition/>
     </mc:Fallback>
   </mc:AlternateContent>
@@ -12156,6 +12613,258 @@
       </p:par>
     </p:tnLst>
   </p:timing>
+</p:sld>
+</file>
+
+<file path=ppt/slides/slide28.xml><?xml version="1.0" encoding="utf-8"?>
+<p:sld xmlns:a="http://schemas.openxmlformats.org/drawingml/2006/main" xmlns:r="http://schemas.openxmlformats.org/officeDocument/2006/relationships" xmlns:p="http://schemas.openxmlformats.org/presentationml/2006/main">
+  <p:cSld>
+    <p:spTree>
+      <p:nvGrpSpPr>
+        <p:cNvPr id="1" name=""/>
+        <p:cNvGrpSpPr/>
+        <p:nvPr/>
+      </p:nvGrpSpPr>
+      <p:grpSpPr>
+        <a:xfrm>
+          <a:off x="0" y="0"/>
+          <a:ext cx="0" cy="0"/>
+          <a:chOff x="0" y="0"/>
+          <a:chExt cx="0" cy="0"/>
+        </a:xfrm>
+      </p:grpSpPr>
+      <p:sp>
+        <p:nvSpPr>
+          <p:cNvPr id="2" name="Nadpis 1"/>
+          <p:cNvSpPr>
+            <a:spLocks noGrp="1"/>
+          </p:cNvSpPr>
+          <p:nvPr>
+            <p:ph type="title"/>
+          </p:nvPr>
+        </p:nvSpPr>
+        <p:spPr/>
+        <p:txBody>
+          <a:bodyPr/>
+          <a:lstStyle/>
+          <a:p>
+            <a:r>
+              <a:rPr lang="cs-CZ" dirty="0" smtClean="0"/>
+              <a:t>Bezpečné ukládání hesel</a:t>
+            </a:r>
+            <a:endParaRPr lang="cs-CZ" dirty="0"/>
+          </a:p>
+        </p:txBody>
+      </p:sp>
+      <p:sp>
+        <p:nvSpPr>
+          <p:cNvPr id="3" name="Zástupný symbol pro obsah 2"/>
+          <p:cNvSpPr>
+            <a:spLocks noGrp="1"/>
+          </p:cNvSpPr>
+          <p:nvPr>
+            <p:ph idx="1"/>
+          </p:nvPr>
+        </p:nvSpPr>
+        <p:spPr/>
+        <p:txBody>
+          <a:bodyPr>
+            <a:normAutofit/>
+          </a:bodyPr>
+          <a:lstStyle/>
+          <a:p>
+            <a:pPr>
+              <a:lnSpc>
+                <a:spcPct val="150000"/>
+              </a:lnSpc>
+            </a:pPr>
+            <a:r>
+              <a:rPr lang="cs-CZ" sz="2400" dirty="0" smtClean="0"/>
+              <a:t>Hesla nejsou ukládána v textové podobě</a:t>
+            </a:r>
+          </a:p>
+          <a:p>
+            <a:pPr>
+              <a:lnSpc>
+                <a:spcPct val="150000"/>
+              </a:lnSpc>
+            </a:pPr>
+            <a:r>
+              <a:rPr lang="cs-CZ" sz="2400" dirty="0" smtClean="0"/>
+              <a:t>Využití </a:t>
+            </a:r>
+            <a:r>
+              <a:rPr lang="cs-CZ" sz="2400" dirty="0" err="1" smtClean="0"/>
+              <a:t>Hashovací</a:t>
+            </a:r>
+            <a:r>
+              <a:rPr lang="cs-CZ" sz="2400" dirty="0" smtClean="0"/>
+              <a:t> funkce a tzv. soli (salt)</a:t>
+            </a:r>
+          </a:p>
+          <a:p>
+            <a:pPr>
+              <a:lnSpc>
+                <a:spcPct val="150000"/>
+              </a:lnSpc>
+            </a:pPr>
+            <a:r>
+              <a:rPr lang="cs-CZ" sz="2400" dirty="0" smtClean="0"/>
+              <a:t>Netriviální postup pro získávání soli</a:t>
+            </a:r>
+          </a:p>
+          <a:p>
+            <a:pPr>
+              <a:lnSpc>
+                <a:spcPct val="150000"/>
+              </a:lnSpc>
+            </a:pPr>
+            <a:r>
+              <a:rPr lang="cs-CZ" sz="2400" dirty="0" smtClean="0"/>
+              <a:t>Neznámý postup </a:t>
+            </a:r>
+            <a:r>
+              <a:rPr lang="cs-CZ" sz="2400" dirty="0" err="1" smtClean="0"/>
+              <a:t>Hashování</a:t>
+            </a:r>
+            <a:endParaRPr lang="cs-CZ" sz="2400" dirty="0" smtClean="0"/>
+          </a:p>
+          <a:p>
+            <a:endParaRPr lang="cs-CZ" sz="2400" dirty="0"/>
+          </a:p>
+        </p:txBody>
+      </p:sp>
+    </p:spTree>
+    <p:extLst>
+      <p:ext uri="{BB962C8B-B14F-4D97-AF65-F5344CB8AC3E}">
+        <p14:creationId xmlns:p14="http://schemas.microsoft.com/office/powerpoint/2010/main" val="2491289788"/>
+      </p:ext>
+    </p:extLst>
+  </p:cSld>
+  <p:clrMapOvr>
+    <a:masterClrMapping/>
+  </p:clrMapOvr>
+  <mc:AlternateContent xmlns:mc="http://schemas.openxmlformats.org/markup-compatibility/2006">
+    <mc:Choice xmlns:p14="http://schemas.microsoft.com/office/powerpoint/2010/main" Requires="p14">
+      <p:transition p14:dur="0"/>
+    </mc:Choice>
+    <mc:Fallback>
+      <p:transition/>
+    </mc:Fallback>
+  </mc:AlternateContent>
+</p:sld>
+</file>
+
+<file path=ppt/slides/slide29.xml><?xml version="1.0" encoding="utf-8"?>
+<p:sld xmlns:a="http://schemas.openxmlformats.org/drawingml/2006/main" xmlns:r="http://schemas.openxmlformats.org/officeDocument/2006/relationships" xmlns:p="http://schemas.openxmlformats.org/presentationml/2006/main">
+  <p:cSld>
+    <p:spTree>
+      <p:nvGrpSpPr>
+        <p:cNvPr id="1" name=""/>
+        <p:cNvGrpSpPr/>
+        <p:nvPr/>
+      </p:nvGrpSpPr>
+      <p:grpSpPr>
+        <a:xfrm>
+          <a:off x="0" y="0"/>
+          <a:ext cx="0" cy="0"/>
+          <a:chOff x="0" y="0"/>
+          <a:chExt cx="0" cy="0"/>
+        </a:xfrm>
+      </p:grpSpPr>
+      <p:sp>
+        <p:nvSpPr>
+          <p:cNvPr id="2" name="Nadpis 1"/>
+          <p:cNvSpPr>
+            <a:spLocks noGrp="1"/>
+          </p:cNvSpPr>
+          <p:nvPr>
+            <p:ph type="title"/>
+          </p:nvPr>
+        </p:nvSpPr>
+        <p:spPr/>
+        <p:txBody>
+          <a:bodyPr/>
+          <a:lstStyle/>
+          <a:p>
+            <a:r>
+              <a:rPr lang="cs-CZ" dirty="0" smtClean="0"/>
+              <a:t>Nezvolení REST API</a:t>
+            </a:r>
+            <a:endParaRPr lang="cs-CZ" dirty="0"/>
+          </a:p>
+        </p:txBody>
+      </p:sp>
+      <p:sp>
+        <p:nvSpPr>
+          <p:cNvPr id="3" name="Zástupný symbol pro obsah 2"/>
+          <p:cNvSpPr>
+            <a:spLocks noGrp="1"/>
+          </p:cNvSpPr>
+          <p:nvPr>
+            <p:ph idx="1"/>
+          </p:nvPr>
+        </p:nvSpPr>
+        <p:spPr/>
+        <p:txBody>
+          <a:bodyPr>
+            <a:normAutofit/>
+          </a:bodyPr>
+          <a:lstStyle/>
+          <a:p>
+            <a:pPr>
+              <a:lnSpc>
+                <a:spcPct val="150000"/>
+              </a:lnSpc>
+            </a:pPr>
+            <a:r>
+              <a:rPr lang="cs-CZ" sz="2400" dirty="0" smtClean="0"/>
+              <a:t>Existující monitorovací systém</a:t>
+            </a:r>
+          </a:p>
+          <a:p>
+            <a:pPr>
+              <a:lnSpc>
+                <a:spcPct val="150000"/>
+              </a:lnSpc>
+            </a:pPr>
+            <a:r>
+              <a:rPr lang="cs-CZ" sz="2400" dirty="0" smtClean="0"/>
+              <a:t>Zadáním webová aplikace</a:t>
+            </a:r>
+          </a:p>
+          <a:p>
+            <a:pPr>
+              <a:lnSpc>
+                <a:spcPct val="150000"/>
+              </a:lnSpc>
+            </a:pPr>
+            <a:r>
+              <a:rPr lang="cs-CZ" sz="2400" dirty="0" smtClean="0"/>
+              <a:t>Využití v některých modulech (metodách)</a:t>
+            </a:r>
+            <a:endParaRPr lang="cs-CZ" sz="2400" dirty="0"/>
+          </a:p>
+        </p:txBody>
+      </p:sp>
+    </p:spTree>
+    <p:extLst>
+      <p:ext uri="{BB962C8B-B14F-4D97-AF65-F5344CB8AC3E}">
+        <p14:creationId xmlns:p14="http://schemas.microsoft.com/office/powerpoint/2010/main" val="3416698712"/>
+      </p:ext>
+    </p:extLst>
+  </p:cSld>
+  <p:clrMapOvr>
+    <a:masterClrMapping/>
+  </p:clrMapOvr>
+  <mc:AlternateContent xmlns:mc="http://schemas.openxmlformats.org/markup-compatibility/2006">
+    <mc:Choice xmlns:p14="http://schemas.microsoft.com/office/powerpoint/2010/main" Requires="p14">
+      <p:transition p14:dur="0"/>
+    </mc:Choice>
+    <mc:Fallback>
+      <p:transition/>
+    </mc:Fallback>
+  </mc:AlternateContent>
 </p:sld>
 </file>
 
@@ -12298,11 +13007,11 @@
   <p:clrMapOvr>
     <a:masterClrMapping/>
   </p:clrMapOvr>
-  <mc:AlternateContent xmlns:mc="http://schemas.openxmlformats.org/markup-compatibility/2006" xmlns:p14="http://schemas.microsoft.com/office/powerpoint/2010/main">
-    <mc:Choice Requires="p14">
+  <mc:AlternateContent xmlns:mc="http://schemas.openxmlformats.org/markup-compatibility/2006">
+    <mc:Choice xmlns:p14="http://schemas.microsoft.com/office/powerpoint/2010/main" Requires="p14">
       <p:transition p14:dur="0"/>
     </mc:Choice>
-    <mc:Fallback xmlns="">
+    <mc:Fallback>
       <p:transition/>
     </mc:Fallback>
   </mc:AlternateContent>
@@ -12313,6 +13022,156 @@
       </p:par>
     </p:tnLst>
   </p:timing>
+</p:sld>
+</file>
+
+<file path=ppt/slides/slide30.xml><?xml version="1.0" encoding="utf-8"?>
+<p:sld xmlns:a="http://schemas.openxmlformats.org/drawingml/2006/main" xmlns:r="http://schemas.openxmlformats.org/officeDocument/2006/relationships" xmlns:p="http://schemas.openxmlformats.org/presentationml/2006/main">
+  <p:cSld>
+    <p:spTree>
+      <p:nvGrpSpPr>
+        <p:cNvPr id="1" name=""/>
+        <p:cNvGrpSpPr/>
+        <p:nvPr/>
+      </p:nvGrpSpPr>
+      <p:grpSpPr>
+        <a:xfrm>
+          <a:off x="0" y="0"/>
+          <a:ext cx="0" cy="0"/>
+          <a:chOff x="0" y="0"/>
+          <a:chExt cx="0" cy="0"/>
+        </a:xfrm>
+      </p:grpSpPr>
+      <p:sp>
+        <p:nvSpPr>
+          <p:cNvPr id="2" name="Nadpis 1"/>
+          <p:cNvSpPr>
+            <a:spLocks noGrp="1"/>
+          </p:cNvSpPr>
+          <p:nvPr>
+            <p:ph type="title"/>
+          </p:nvPr>
+        </p:nvSpPr>
+        <p:spPr/>
+        <p:txBody>
+          <a:bodyPr/>
+          <a:lstStyle/>
+          <a:p>
+            <a:r>
+              <a:rPr lang="cs-CZ" dirty="0" smtClean="0"/>
+              <a:t>Změny v návrhu</a:t>
+            </a:r>
+            <a:endParaRPr lang="cs-CZ" dirty="0"/>
+          </a:p>
+        </p:txBody>
+      </p:sp>
+      <p:sp>
+        <p:nvSpPr>
+          <p:cNvPr id="3" name="Zástupný symbol pro obsah 2"/>
+          <p:cNvSpPr>
+            <a:spLocks noGrp="1"/>
+          </p:cNvSpPr>
+          <p:nvPr>
+            <p:ph idx="1"/>
+          </p:nvPr>
+        </p:nvSpPr>
+        <p:spPr/>
+        <p:txBody>
+          <a:bodyPr>
+            <a:normAutofit/>
+          </a:bodyPr>
+          <a:lstStyle/>
+          <a:p>
+            <a:pPr>
+              <a:lnSpc>
+                <a:spcPct val="150000"/>
+              </a:lnSpc>
+            </a:pPr>
+            <a:r>
+              <a:rPr lang="cs-CZ" sz="2400" dirty="0" smtClean="0"/>
+              <a:t>Úplné oddělení databázové logiky</a:t>
+            </a:r>
+          </a:p>
+          <a:p>
+            <a:pPr>
+              <a:lnSpc>
+                <a:spcPct val="150000"/>
+              </a:lnSpc>
+            </a:pPr>
+            <a:r>
+              <a:rPr lang="cs-CZ" sz="2400" dirty="0" smtClean="0"/>
+              <a:t>Rozlišení </a:t>
+            </a:r>
+            <a:r>
+              <a:rPr lang="cs-CZ" sz="2400" dirty="0" err="1" smtClean="0"/>
+              <a:t>facade</a:t>
+            </a:r>
+            <a:r>
+              <a:rPr lang="cs-CZ" sz="2400" dirty="0" smtClean="0"/>
+              <a:t> od modelu</a:t>
+            </a:r>
+          </a:p>
+          <a:p>
+            <a:pPr>
+              <a:lnSpc>
+                <a:spcPct val="150000"/>
+              </a:lnSpc>
+            </a:pPr>
+            <a:r>
+              <a:rPr lang="cs-CZ" sz="2400" dirty="0" smtClean="0"/>
+              <a:t>Větší využití REST</a:t>
+            </a:r>
+          </a:p>
+          <a:p>
+            <a:pPr>
+              <a:lnSpc>
+                <a:spcPct val="150000"/>
+              </a:lnSpc>
+            </a:pPr>
+            <a:r>
+              <a:rPr lang="cs-CZ" sz="2400" dirty="0" smtClean="0"/>
+              <a:t>Větší využití AJAX</a:t>
+            </a:r>
+          </a:p>
+          <a:p>
+            <a:pPr>
+              <a:lnSpc>
+                <a:spcPct val="150000"/>
+              </a:lnSpc>
+            </a:pPr>
+            <a:r>
+              <a:rPr lang="cs-CZ" sz="2400" dirty="0" smtClean="0"/>
+              <a:t>Responsivní design aplikace</a:t>
+            </a:r>
+          </a:p>
+          <a:p>
+            <a:pPr>
+              <a:lnSpc>
+                <a:spcPct val="150000"/>
+              </a:lnSpc>
+            </a:pPr>
+            <a:endParaRPr lang="cs-CZ" sz="2400" dirty="0"/>
+          </a:p>
+        </p:txBody>
+      </p:sp>
+    </p:spTree>
+    <p:extLst>
+      <p:ext uri="{BB962C8B-B14F-4D97-AF65-F5344CB8AC3E}">
+        <p14:creationId xmlns:p14="http://schemas.microsoft.com/office/powerpoint/2010/main" val="2772485255"/>
+      </p:ext>
+    </p:extLst>
+  </p:cSld>
+  <p:clrMapOvr>
+    <a:masterClrMapping/>
+  </p:clrMapOvr>
+  <mc:AlternateContent xmlns:mc="http://schemas.openxmlformats.org/markup-compatibility/2006">
+    <mc:Choice xmlns:p14="http://schemas.microsoft.com/office/powerpoint/2010/main" Requires="p14">
+      <p:transition p14:dur="0"/>
+    </mc:Choice>
+    <mc:Fallback>
+      <p:transition/>
+    </mc:Fallback>
+  </mc:AlternateContent>
 </p:sld>
 </file>
 
@@ -15917,11 +16776,11 @@
   <p:clrMapOvr>
     <a:masterClrMapping/>
   </p:clrMapOvr>
-  <mc:AlternateContent xmlns:mc="http://schemas.openxmlformats.org/markup-compatibility/2006" xmlns:p14="http://schemas.microsoft.com/office/powerpoint/2010/main">
-    <mc:Choice Requires="p14">
+  <mc:AlternateContent xmlns:mc="http://schemas.openxmlformats.org/markup-compatibility/2006">
+    <mc:Choice xmlns:p14="http://schemas.microsoft.com/office/powerpoint/2010/main" Requires="p14">
       <p:transition p14:dur="0"/>
     </mc:Choice>
-    <mc:Fallback xmlns="">
+    <mc:Fallback>
       <p:transition/>
     </mc:Fallback>
   </mc:AlternateContent>
@@ -19608,11 +20467,11 @@
   <p:clrMapOvr>
     <a:masterClrMapping/>
   </p:clrMapOvr>
-  <mc:AlternateContent xmlns:mc="http://schemas.openxmlformats.org/markup-compatibility/2006" xmlns:p14="http://schemas.microsoft.com/office/powerpoint/2010/main">
-    <mc:Choice Requires="p14">
+  <mc:AlternateContent xmlns:mc="http://schemas.openxmlformats.org/markup-compatibility/2006">
+    <mc:Choice xmlns:p14="http://schemas.microsoft.com/office/powerpoint/2010/main" Requires="p14">
       <p:transition p14:dur="0"/>
     </mc:Choice>
-    <mc:Fallback xmlns="">
+    <mc:Fallback>
       <p:transition/>
     </mc:Fallback>
   </mc:AlternateContent>
@@ -19705,11 +20564,11 @@
   <p:clrMapOvr>
     <a:masterClrMapping/>
   </p:clrMapOvr>
-  <mc:AlternateContent xmlns:mc="http://schemas.openxmlformats.org/markup-compatibility/2006" xmlns:p14="http://schemas.microsoft.com/office/powerpoint/2010/main">
-    <mc:Choice Requires="p14">
+  <mc:AlternateContent xmlns:mc="http://schemas.openxmlformats.org/markup-compatibility/2006">
+    <mc:Choice xmlns:p14="http://schemas.microsoft.com/office/powerpoint/2010/main" Requires="p14">
       <p:transition p14:dur="0"/>
     </mc:Choice>
-    <mc:Fallback xmlns="">
+    <mc:Fallback>
       <p:transition/>
     </mc:Fallback>
   </mc:AlternateContent>
@@ -19802,11 +20661,11 @@
   <p:clrMapOvr>
     <a:masterClrMapping/>
   </p:clrMapOvr>
-  <mc:AlternateContent xmlns:mc="http://schemas.openxmlformats.org/markup-compatibility/2006" xmlns:p14="http://schemas.microsoft.com/office/powerpoint/2010/main">
-    <mc:Choice Requires="p14">
+  <mc:AlternateContent xmlns:mc="http://schemas.openxmlformats.org/markup-compatibility/2006">
+    <mc:Choice xmlns:p14="http://schemas.microsoft.com/office/powerpoint/2010/main" Requires="p14">
       <p:transition p14:dur="0"/>
     </mc:Choice>
-    <mc:Fallback xmlns="">
+    <mc:Fallback>
       <p:transition/>
     </mc:Fallback>
   </mc:AlternateContent>
@@ -19959,11 +20818,11 @@
   <p:clrMapOvr>
     <a:masterClrMapping/>
   </p:clrMapOvr>
-  <mc:AlternateContent xmlns:mc="http://schemas.openxmlformats.org/markup-compatibility/2006" xmlns:p14="http://schemas.microsoft.com/office/powerpoint/2010/main">
-    <mc:Choice Requires="p14">
+  <mc:AlternateContent xmlns:mc="http://schemas.openxmlformats.org/markup-compatibility/2006">
+    <mc:Choice xmlns:p14="http://schemas.microsoft.com/office/powerpoint/2010/main" Requires="p14">
       <p:transition p14:dur="0"/>
     </mc:Choice>
-    <mc:Fallback xmlns="">
+    <mc:Fallback>
       <p:transition/>
     </mc:Fallback>
   </mc:AlternateContent>
@@ -20098,11 +20957,11 @@
   <p:clrMapOvr>
     <a:masterClrMapping/>
   </p:clrMapOvr>
-  <mc:AlternateContent xmlns:mc="http://schemas.openxmlformats.org/markup-compatibility/2006" xmlns:p14="http://schemas.microsoft.com/office/powerpoint/2010/main">
-    <mc:Choice Requires="p14">
+  <mc:AlternateContent xmlns:mc="http://schemas.openxmlformats.org/markup-compatibility/2006">
+    <mc:Choice xmlns:p14="http://schemas.microsoft.com/office/powerpoint/2010/main" Requires="p14">
       <p:transition p14:dur="0"/>
     </mc:Choice>
-    <mc:Fallback xmlns="">
+    <mc:Fallback>
       <p:transition/>
     </mc:Fallback>
   </mc:AlternateContent>

</xml_diff>

<commit_message>
Poslední úprava otázek čekáme na vyjádření
</commit_message>
<xml_diff>
--- a/prezentace diplomka/DP_Diani.pptx
+++ b/prezentace diplomka/DP_Diani.pptx
@@ -2845,23 +2845,7 @@
             </a:r>
             <a:r>
               <a:rPr lang="cs-CZ" baseline="0" dirty="0" smtClean="0"/>
-              <a:t> rámci </a:t>
-            </a:r>
-            <a:r>
-              <a:rPr lang="cs-CZ" baseline="0" dirty="0" smtClean="0"/>
-              <a:t>diplomové práce </a:t>
-            </a:r>
-            <a:r>
-              <a:rPr lang="cs-CZ" baseline="0" dirty="0" smtClean="0"/>
-              <a:t>jsem udělal rešerši existující </a:t>
-            </a:r>
-            <a:r>
-              <a:rPr lang="cs-CZ" baseline="0" dirty="0" smtClean="0"/>
-              <a:t>podobných </a:t>
-            </a:r>
-            <a:r>
-              <a:rPr lang="cs-CZ" baseline="0" dirty="0" smtClean="0"/>
-              <a:t>řešení.</a:t>
+              <a:t> rámci diplomové práce jsem udělal rešerši existující podobných řešení.</a:t>
             </a:r>
             <a:endParaRPr lang="cs-CZ" dirty="0"/>
           </a:p>
@@ -3078,15 +3062,7 @@
           <a:p>
             <a:r>
               <a:rPr lang="cs-CZ" dirty="0" smtClean="0"/>
-              <a:t>Výchozí </a:t>
-            </a:r>
-            <a:r>
-              <a:rPr lang="cs-CZ" dirty="0" smtClean="0"/>
-              <a:t>stav bylo že </a:t>
-            </a:r>
-            <a:r>
-              <a:rPr lang="cs-CZ" dirty="0" smtClean="0"/>
-              <a:t>chyběla webová aplikace již</a:t>
+              <a:t>Výchozí stav bylo že chyběla webová aplikace již</a:t>
             </a:r>
             <a:r>
               <a:rPr lang="cs-CZ" baseline="0" dirty="0" smtClean="0"/>
@@ -9670,11 +9646,11 @@
   <p:clrMapOvr>
     <a:masterClrMapping/>
   </p:clrMapOvr>
-  <mc:AlternateContent xmlns:mc="http://schemas.openxmlformats.org/markup-compatibility/2006">
-    <mc:Choice xmlns:p14="http://schemas.microsoft.com/office/powerpoint/2010/main" Requires="p14">
+  <mc:AlternateContent xmlns:mc="http://schemas.openxmlformats.org/markup-compatibility/2006" xmlns:p14="http://schemas.microsoft.com/office/powerpoint/2010/main">
+    <mc:Choice Requires="p14">
       <p:transition p14:dur="0"/>
     </mc:Choice>
-    <mc:Fallback>
+    <mc:Fallback xmlns="">
       <p:transition/>
     </mc:Fallback>
   </mc:AlternateContent>
@@ -9876,11 +9852,11 @@
   <p:clrMapOvr>
     <a:masterClrMapping/>
   </p:clrMapOvr>
-  <mc:AlternateContent xmlns:mc="http://schemas.openxmlformats.org/markup-compatibility/2006">
-    <mc:Choice xmlns:p14="http://schemas.microsoft.com/office/powerpoint/2010/main" Requires="p14">
+  <mc:AlternateContent xmlns:mc="http://schemas.openxmlformats.org/markup-compatibility/2006" xmlns:p14="http://schemas.microsoft.com/office/powerpoint/2010/main">
+    <mc:Choice Requires="p14">
       <p:transition p14:dur="0"/>
     </mc:Choice>
-    <mc:Fallback>
+    <mc:Fallback xmlns="">
       <p:transition/>
     </mc:Fallback>
   </mc:AlternateContent>
@@ -10173,11 +10149,11 @@
   <p:clrMapOvr>
     <a:masterClrMapping/>
   </p:clrMapOvr>
-  <mc:AlternateContent xmlns:mc="http://schemas.openxmlformats.org/markup-compatibility/2006">
-    <mc:Choice xmlns:p14="http://schemas.microsoft.com/office/powerpoint/2010/main" Requires="p14">
+  <mc:AlternateContent xmlns:mc="http://schemas.openxmlformats.org/markup-compatibility/2006" xmlns:p14="http://schemas.microsoft.com/office/powerpoint/2010/main">
+    <mc:Choice Requires="p14">
       <p:transition p14:dur="0"/>
     </mc:Choice>
-    <mc:Fallback>
+    <mc:Fallback xmlns="">
       <p:transition/>
     </mc:Fallback>
   </mc:AlternateContent>
@@ -10330,11 +10306,11 @@
   <p:clrMapOvr>
     <a:masterClrMapping/>
   </p:clrMapOvr>
-  <mc:AlternateContent xmlns:mc="http://schemas.openxmlformats.org/markup-compatibility/2006">
-    <mc:Choice xmlns:p14="http://schemas.microsoft.com/office/powerpoint/2010/main" Requires="p14">
+  <mc:AlternateContent xmlns:mc="http://schemas.openxmlformats.org/markup-compatibility/2006" xmlns:p14="http://schemas.microsoft.com/office/powerpoint/2010/main">
+    <mc:Choice Requires="p14">
       <p:transition p14:dur="0"/>
     </mc:Choice>
-    <mc:Fallback>
+    <mc:Fallback xmlns="">
       <p:transition/>
     </mc:Fallback>
   </mc:AlternateContent>
@@ -10448,11 +10424,11 @@
   <p:clrMapOvr>
     <a:masterClrMapping/>
   </p:clrMapOvr>
-  <mc:AlternateContent xmlns:mc="http://schemas.openxmlformats.org/markup-compatibility/2006">
-    <mc:Choice xmlns:p14="http://schemas.microsoft.com/office/powerpoint/2010/main" Requires="p14">
+  <mc:AlternateContent xmlns:mc="http://schemas.openxmlformats.org/markup-compatibility/2006" xmlns:p14="http://schemas.microsoft.com/office/powerpoint/2010/main">
+    <mc:Choice Requires="p14">
       <p:transition p14:dur="0"/>
     </mc:Choice>
-    <mc:Fallback>
+    <mc:Fallback xmlns="">
       <p:transition/>
     </mc:Fallback>
   </mc:AlternateContent>
@@ -10576,11 +10552,11 @@
   <p:clrMapOvr>
     <a:masterClrMapping/>
   </p:clrMapOvr>
-  <mc:AlternateContent xmlns:mc="http://schemas.openxmlformats.org/markup-compatibility/2006">
-    <mc:Choice xmlns:p14="http://schemas.microsoft.com/office/powerpoint/2010/main" Requires="p14">
+  <mc:AlternateContent xmlns:mc="http://schemas.openxmlformats.org/markup-compatibility/2006" xmlns:p14="http://schemas.microsoft.com/office/powerpoint/2010/main">
+    <mc:Choice Requires="p14">
       <p:transition p14:dur="0"/>
     </mc:Choice>
-    <mc:Fallback>
+    <mc:Fallback xmlns="">
       <p:transition/>
     </mc:Fallback>
   </mc:AlternateContent>
@@ -10666,11 +10642,11 @@
   <p:clrMapOvr>
     <a:masterClrMapping/>
   </p:clrMapOvr>
-  <mc:AlternateContent xmlns:mc="http://schemas.openxmlformats.org/markup-compatibility/2006">
-    <mc:Choice xmlns:p14="http://schemas.microsoft.com/office/powerpoint/2010/main" Requires="p14">
+  <mc:AlternateContent xmlns:mc="http://schemas.openxmlformats.org/markup-compatibility/2006" xmlns:p14="http://schemas.microsoft.com/office/powerpoint/2010/main">
+    <mc:Choice Requires="p14">
       <p:transition p14:dur="0"/>
     </mc:Choice>
-    <mc:Fallback>
+    <mc:Fallback xmlns="">
       <p:transition/>
     </mc:Fallback>
   </mc:AlternateContent>
@@ -10886,11 +10862,11 @@
   <p:clrMapOvr>
     <a:masterClrMapping/>
   </p:clrMapOvr>
-  <mc:AlternateContent xmlns:mc="http://schemas.openxmlformats.org/markup-compatibility/2006">
-    <mc:Choice xmlns:p14="http://schemas.microsoft.com/office/powerpoint/2010/main" Requires="p14">
+  <mc:AlternateContent xmlns:mc="http://schemas.openxmlformats.org/markup-compatibility/2006" xmlns:p14="http://schemas.microsoft.com/office/powerpoint/2010/main">
+    <mc:Choice Requires="p14">
       <p:transition p14:dur="0"/>
     </mc:Choice>
-    <mc:Fallback>
+    <mc:Fallback xmlns="">
       <p:transition/>
     </mc:Fallback>
   </mc:AlternateContent>
@@ -10982,11 +10958,11 @@
   <p:clrMapOvr>
     <a:masterClrMapping/>
   </p:clrMapOvr>
-  <mc:AlternateContent xmlns:mc="http://schemas.openxmlformats.org/markup-compatibility/2006">
-    <mc:Choice xmlns:p14="http://schemas.microsoft.com/office/powerpoint/2010/main" Requires="p14">
+  <mc:AlternateContent xmlns:mc="http://schemas.openxmlformats.org/markup-compatibility/2006" xmlns:p14="http://schemas.microsoft.com/office/powerpoint/2010/main">
+    <mc:Choice Requires="p14">
       <p:transition p14:dur="0"/>
     </mc:Choice>
-    <mc:Fallback>
+    <mc:Fallback xmlns="">
       <p:transition/>
     </mc:Fallback>
   </mc:AlternateContent>
@@ -11170,11 +11146,11 @@
   <p:clrMapOvr>
     <a:masterClrMapping/>
   </p:clrMapOvr>
-  <mc:AlternateContent xmlns:mc="http://schemas.openxmlformats.org/markup-compatibility/2006">
-    <mc:Choice xmlns:p14="http://schemas.microsoft.com/office/powerpoint/2010/main" Requires="p14">
+  <mc:AlternateContent xmlns:mc="http://schemas.openxmlformats.org/markup-compatibility/2006" xmlns:p14="http://schemas.microsoft.com/office/powerpoint/2010/main">
+    <mc:Choice Requires="p14">
       <p:transition p14:dur="0"/>
     </mc:Choice>
-    <mc:Fallback>
+    <mc:Fallback xmlns="">
       <p:transition/>
     </mc:Fallback>
   </mc:AlternateContent>
@@ -11266,11 +11242,11 @@
   <p:clrMapOvr>
     <a:masterClrMapping/>
   </p:clrMapOvr>
-  <mc:AlternateContent xmlns:mc="http://schemas.openxmlformats.org/markup-compatibility/2006">
-    <mc:Choice xmlns:p14="http://schemas.microsoft.com/office/powerpoint/2010/main" Requires="p14">
+  <mc:AlternateContent xmlns:mc="http://schemas.openxmlformats.org/markup-compatibility/2006" xmlns:p14="http://schemas.microsoft.com/office/powerpoint/2010/main">
+    <mc:Choice Requires="p14">
       <p:transition p14:dur="0"/>
     </mc:Choice>
-    <mc:Fallback>
+    <mc:Fallback xmlns="">
       <p:transition/>
     </mc:Fallback>
   </mc:AlternateContent>
@@ -11408,11 +11384,11 @@
   <p:clrMapOvr>
     <a:masterClrMapping/>
   </p:clrMapOvr>
-  <mc:AlternateContent xmlns:mc="http://schemas.openxmlformats.org/markup-compatibility/2006">
-    <mc:Choice xmlns:p14="http://schemas.microsoft.com/office/powerpoint/2010/main" Requires="p14">
+  <mc:AlternateContent xmlns:mc="http://schemas.openxmlformats.org/markup-compatibility/2006" xmlns:p14="http://schemas.microsoft.com/office/powerpoint/2010/main">
+    <mc:Choice Requires="p14">
       <p:transition p14:dur="0"/>
     </mc:Choice>
-    <mc:Fallback>
+    <mc:Fallback xmlns="">
       <p:transition/>
     </mc:Fallback>
   </mc:AlternateContent>
@@ -11504,11 +11480,11 @@
   <p:clrMapOvr>
     <a:masterClrMapping/>
   </p:clrMapOvr>
-  <mc:AlternateContent xmlns:mc="http://schemas.openxmlformats.org/markup-compatibility/2006">
-    <mc:Choice xmlns:p14="http://schemas.microsoft.com/office/powerpoint/2010/main" Requires="p14">
+  <mc:AlternateContent xmlns:mc="http://schemas.openxmlformats.org/markup-compatibility/2006" xmlns:p14="http://schemas.microsoft.com/office/powerpoint/2010/main">
+    <mc:Choice Requires="p14">
       <p:transition p14:dur="0"/>
     </mc:Choice>
-    <mc:Fallback>
+    <mc:Fallback xmlns="">
       <p:transition/>
     </mc:Fallback>
   </mc:AlternateContent>
@@ -11692,11 +11668,11 @@
   <p:clrMapOvr>
     <a:masterClrMapping/>
   </p:clrMapOvr>
-  <mc:AlternateContent xmlns:mc="http://schemas.openxmlformats.org/markup-compatibility/2006">
-    <mc:Choice xmlns:p14="http://schemas.microsoft.com/office/powerpoint/2010/main" Requires="p14">
+  <mc:AlternateContent xmlns:mc="http://schemas.openxmlformats.org/markup-compatibility/2006" xmlns:p14="http://schemas.microsoft.com/office/powerpoint/2010/main">
+    <mc:Choice Requires="p14">
       <p:transition p14:dur="0"/>
     </mc:Choice>
-    <mc:Fallback>
+    <mc:Fallback xmlns="">
       <p:transition/>
     </mc:Fallback>
   </mc:AlternateContent>
@@ -11791,11 +11767,11 @@
   <p:clrMapOvr>
     <a:masterClrMapping/>
   </p:clrMapOvr>
-  <mc:AlternateContent xmlns:mc="http://schemas.openxmlformats.org/markup-compatibility/2006">
-    <mc:Choice xmlns:p14="http://schemas.microsoft.com/office/powerpoint/2010/main" Requires="p14">
+  <mc:AlternateContent xmlns:mc="http://schemas.openxmlformats.org/markup-compatibility/2006" xmlns:p14="http://schemas.microsoft.com/office/powerpoint/2010/main">
+    <mc:Choice Requires="p14">
       <p:transition p14:dur="0"/>
     </mc:Choice>
-    <mc:Fallback>
+    <mc:Fallback xmlns="">
       <p:transition/>
     </mc:Fallback>
   </mc:AlternateContent>
@@ -11948,11 +11924,11 @@
   <p:clrMapOvr>
     <a:masterClrMapping/>
   </p:clrMapOvr>
-  <mc:AlternateContent xmlns:mc="http://schemas.openxmlformats.org/markup-compatibility/2006">
-    <mc:Choice xmlns:p14="http://schemas.microsoft.com/office/powerpoint/2010/main" Requires="p14">
+  <mc:AlternateContent xmlns:mc="http://schemas.openxmlformats.org/markup-compatibility/2006" xmlns:p14="http://schemas.microsoft.com/office/powerpoint/2010/main">
+    <mc:Choice Requires="p14">
       <p:transition p14:dur="0"/>
     </mc:Choice>
-    <mc:Fallback>
+    <mc:Fallback xmlns="">
       <p:transition/>
     </mc:Fallback>
   </mc:AlternateContent>
@@ -12090,11 +12066,11 @@
   <p:clrMapOvr>
     <a:masterClrMapping/>
   </p:clrMapOvr>
-  <mc:AlternateContent xmlns:mc="http://schemas.openxmlformats.org/markup-compatibility/2006">
-    <mc:Choice xmlns:p14="http://schemas.microsoft.com/office/powerpoint/2010/main" Requires="p14">
+  <mc:AlternateContent xmlns:mc="http://schemas.openxmlformats.org/markup-compatibility/2006" xmlns:p14="http://schemas.microsoft.com/office/powerpoint/2010/main">
+    <mc:Choice Requires="p14">
       <p:transition p14:dur="0"/>
     </mc:Choice>
-    <mc:Fallback>
+    <mc:Fallback xmlns="">
       <p:transition/>
     </mc:Fallback>
   </mc:AlternateContent>
@@ -12225,11 +12201,11 @@
   <p:clrMapOvr>
     <a:masterClrMapping/>
   </p:clrMapOvr>
-  <mc:AlternateContent xmlns:mc="http://schemas.openxmlformats.org/markup-compatibility/2006">
-    <mc:Choice xmlns:p14="http://schemas.microsoft.com/office/powerpoint/2010/main" Requires="p14">
+  <mc:AlternateContent xmlns:mc="http://schemas.openxmlformats.org/markup-compatibility/2006" xmlns:p14="http://schemas.microsoft.com/office/powerpoint/2010/main">
+    <mc:Choice Requires="p14">
       <p:transition p14:dur="0"/>
     </mc:Choice>
-    <mc:Fallback>
+    <mc:Fallback xmlns="">
       <p:transition/>
     </mc:Fallback>
   </mc:AlternateContent>
@@ -12437,11 +12413,11 @@
   <p:clrMapOvr>
     <a:masterClrMapping/>
   </p:clrMapOvr>
-  <mc:AlternateContent xmlns:mc="http://schemas.openxmlformats.org/markup-compatibility/2006">
-    <mc:Choice xmlns:p14="http://schemas.microsoft.com/office/powerpoint/2010/main" Requires="p14">
+  <mc:AlternateContent xmlns:mc="http://schemas.openxmlformats.org/markup-compatibility/2006" xmlns:p14="http://schemas.microsoft.com/office/powerpoint/2010/main">
+    <mc:Choice Requires="p14">
       <p:transition p14:dur="0"/>
     </mc:Choice>
-    <mc:Fallback>
+    <mc:Fallback xmlns="">
       <p:transition/>
     </mc:Fallback>
   </mc:AlternateContent>
@@ -12495,99 +12471,6 @@
           </a:p>
         </p:txBody>
       </p:sp>
-      <p:sp>
-        <p:nvSpPr>
-          <p:cNvPr id="2" name="Zástupný symbol pro obsah 1"/>
-          <p:cNvSpPr>
-            <a:spLocks noGrp="1"/>
-          </p:cNvSpPr>
-          <p:nvPr>
-            <p:ph idx="1"/>
-          </p:nvPr>
-        </p:nvSpPr>
-        <p:spPr>
-          <a:xfrm>
-            <a:off x="646112" y="2052918"/>
-            <a:ext cx="10979832" cy="4195481"/>
-          </a:xfrm>
-        </p:spPr>
-        <p:txBody>
-          <a:bodyPr>
-            <a:normAutofit/>
-          </a:bodyPr>
-          <a:lstStyle/>
-          <a:p>
-            <a:pPr>
-              <a:lnSpc>
-                <a:spcPct val="150000"/>
-              </a:lnSpc>
-            </a:pPr>
-            <a:r>
-              <a:rPr lang="cs-CZ" sz="2400" dirty="0"/>
-              <a:t>Jakým způsobem je řešeno bezpečné ukládání hesel v DB? Jak jsou </a:t>
-            </a:r>
-            <a:r>
-              <a:rPr lang="cs-CZ" sz="2400" dirty="0" smtClean="0"/>
-              <a:t>zabezpečena proti </a:t>
-            </a:r>
-            <a:r>
-              <a:rPr lang="cs-CZ" sz="2400" dirty="0"/>
-              <a:t>statistickým útokům nebo odcizení DB?</a:t>
-            </a:r>
-          </a:p>
-          <a:p>
-            <a:pPr>
-              <a:lnSpc>
-                <a:spcPct val="150000"/>
-              </a:lnSpc>
-            </a:pPr>
-            <a:r>
-              <a:rPr lang="cs-CZ" sz="2400" dirty="0" smtClean="0"/>
-              <a:t>Proč </a:t>
-            </a:r>
-            <a:r>
-              <a:rPr lang="cs-CZ" sz="2400" dirty="0"/>
-              <a:t>jste nezvolil řešení s REST API?</a:t>
-            </a:r>
-          </a:p>
-          <a:p>
-            <a:pPr>
-              <a:lnSpc>
-                <a:spcPct val="150000"/>
-              </a:lnSpc>
-            </a:pPr>
-            <a:r>
-              <a:rPr lang="cs-CZ" sz="2400" dirty="0" smtClean="0"/>
-              <a:t>Oproti původní </a:t>
-            </a:r>
-            <a:r>
-              <a:rPr lang="cs-CZ" sz="2400" dirty="0"/>
-              <a:t>implementaci z </a:t>
-            </a:r>
-            <a:r>
-              <a:rPr lang="cs-CZ" sz="2400" dirty="0" smtClean="0"/>
-              <a:t>roku </a:t>
-            </a:r>
-            <a:r>
-              <a:rPr lang="cs-CZ" sz="2400" dirty="0"/>
-              <a:t>2016, jaké změny v návrhu/technologiích </a:t>
-            </a:r>
-            <a:r>
-              <a:rPr lang="cs-CZ" sz="2400" dirty="0" smtClean="0"/>
-              <a:t>byste </a:t>
-            </a:r>
-            <a:r>
-              <a:rPr lang="pt-BR" sz="2400" dirty="0" smtClean="0"/>
-              <a:t>navrhoval </a:t>
-            </a:r>
-            <a:r>
-              <a:rPr lang="pt-BR" sz="2400" dirty="0"/>
-              <a:t>s ohledem na dnešní (a budoucí) vývoj?</a:t>
-            </a:r>
-            <a:endParaRPr lang="cs-CZ" sz="2400" dirty="0"/>
-          </a:p>
-        </p:txBody>
-      </p:sp>
     </p:spTree>
     <p:extLst>
       <p:ext uri="{BB962C8B-B14F-4D97-AF65-F5344CB8AC3E}">
@@ -12598,11 +12481,11 @@
   <p:clrMapOvr>
     <a:masterClrMapping/>
   </p:clrMapOvr>
-  <mc:AlternateContent xmlns:mc="http://schemas.openxmlformats.org/markup-compatibility/2006">
-    <mc:Choice xmlns:p14="http://schemas.microsoft.com/office/powerpoint/2010/main" Requires="p14">
+  <mc:AlternateContent xmlns:mc="http://schemas.openxmlformats.org/markup-compatibility/2006" xmlns:p14="http://schemas.microsoft.com/office/powerpoint/2010/main">
+    <mc:Choice Requires="p14">
       <p:transition p14:dur="0"/>
     </mc:Choice>
-    <mc:Fallback>
+    <mc:Fallback xmlns="">
       <p:transition/>
     </mc:Fallback>
   </mc:AlternateContent>
@@ -12650,7 +12533,7 @@
           <a:p>
             <a:r>
               <a:rPr lang="cs-CZ" dirty="0" smtClean="0"/>
-              <a:t>Bezpečné ukládání hesel</a:t>
+              <a:t>Otázka č. 1</a:t>
             </a:r>
             <a:endParaRPr lang="cs-CZ" dirty="0"/>
           </a:p>
@@ -12666,12 +12549,33 @@
             <p:ph idx="1"/>
           </p:nvPr>
         </p:nvSpPr>
-        <p:spPr/>
+        <p:spPr>
+          <a:xfrm>
+            <a:off x="646112" y="2052918"/>
+            <a:ext cx="10516694" cy="4195481"/>
+          </a:xfrm>
+        </p:spPr>
         <p:txBody>
           <a:bodyPr>
             <a:normAutofit/>
           </a:bodyPr>
           <a:lstStyle/>
+          <a:p>
+            <a:pPr marL="0" indent="0">
+              <a:lnSpc>
+                <a:spcPct val="150000"/>
+              </a:lnSpc>
+              <a:buNone/>
+            </a:pPr>
+            <a:r>
+              <a:rPr lang="cs-CZ" sz="2400" b="1" dirty="0"/>
+              <a:t>Jakým způsobem je řešeno bezpečné ukládání hesel v DB? Jak jsou zabezpečena proti statistickým útokům nebo odcizení DB</a:t>
+            </a:r>
+            <a:r>
+              <a:rPr lang="cs-CZ" sz="2400" b="1" dirty="0" smtClean="0"/>
+              <a:t>?</a:t>
+            </a:r>
+          </a:p>
           <a:p>
             <a:pPr>
               <a:lnSpc>
@@ -12744,11 +12648,11 @@
   <p:clrMapOvr>
     <a:masterClrMapping/>
   </p:clrMapOvr>
-  <mc:AlternateContent xmlns:mc="http://schemas.openxmlformats.org/markup-compatibility/2006">
-    <mc:Choice xmlns:p14="http://schemas.microsoft.com/office/powerpoint/2010/main" Requires="p14">
+  <mc:AlternateContent xmlns:mc="http://schemas.openxmlformats.org/markup-compatibility/2006" xmlns:p14="http://schemas.microsoft.com/office/powerpoint/2010/main">
+    <mc:Choice Requires="p14">
       <p:transition p14:dur="0"/>
     </mc:Choice>
-    <mc:Fallback>
+    <mc:Fallback xmlns="">
       <p:transition/>
     </mc:Fallback>
   </mc:AlternateContent>
@@ -12789,7 +12693,7 @@
           <a:p>
             <a:r>
               <a:rPr lang="cs-CZ" dirty="0" smtClean="0"/>
-              <a:t>Nezvolení REST API</a:t>
+              <a:t>Otázka č. 2</a:t>
             </a:r>
             <a:endParaRPr lang="cs-CZ" dirty="0"/>
           </a:p>
@@ -12805,12 +12709,29 @@
             <p:ph idx="1"/>
           </p:nvPr>
         </p:nvSpPr>
-        <p:spPr/>
+        <p:spPr>
+          <a:xfrm>
+            <a:off x="646112" y="2052918"/>
+            <a:ext cx="9403742" cy="4195481"/>
+          </a:xfrm>
+        </p:spPr>
         <p:txBody>
           <a:bodyPr>
             <a:normAutofit/>
           </a:bodyPr>
           <a:lstStyle/>
+          <a:p>
+            <a:pPr marL="0" indent="0">
+              <a:lnSpc>
+                <a:spcPct val="150000"/>
+              </a:lnSpc>
+              <a:buNone/>
+            </a:pPr>
+            <a:r>
+              <a:rPr lang="cs-CZ" sz="2400" b="1" dirty="0"/>
+              <a:t>Proč jste nezvolil řešení s REST API?</a:t>
+            </a:r>
+          </a:p>
           <a:p>
             <a:pPr>
               <a:lnSpc>
@@ -12857,11 +12778,11 @@
   <p:clrMapOvr>
     <a:masterClrMapping/>
   </p:clrMapOvr>
-  <mc:AlternateContent xmlns:mc="http://schemas.openxmlformats.org/markup-compatibility/2006">
-    <mc:Choice xmlns:p14="http://schemas.microsoft.com/office/powerpoint/2010/main" Requires="p14">
+  <mc:AlternateContent xmlns:mc="http://schemas.openxmlformats.org/markup-compatibility/2006" xmlns:p14="http://schemas.microsoft.com/office/powerpoint/2010/main">
+    <mc:Choice Requires="p14">
       <p:transition p14:dur="0"/>
     </mc:Choice>
-    <mc:Fallback>
+    <mc:Fallback xmlns="">
       <p:transition/>
     </mc:Fallback>
   </mc:AlternateContent>
@@ -13007,11 +12928,11 @@
   <p:clrMapOvr>
     <a:masterClrMapping/>
   </p:clrMapOvr>
-  <mc:AlternateContent xmlns:mc="http://schemas.openxmlformats.org/markup-compatibility/2006">
-    <mc:Choice xmlns:p14="http://schemas.microsoft.com/office/powerpoint/2010/main" Requires="p14">
+  <mc:AlternateContent xmlns:mc="http://schemas.openxmlformats.org/markup-compatibility/2006" xmlns:p14="http://schemas.microsoft.com/office/powerpoint/2010/main">
+    <mc:Choice Requires="p14">
       <p:transition p14:dur="0"/>
     </mc:Choice>
-    <mc:Fallback>
+    <mc:Fallback xmlns="">
       <p:transition/>
     </mc:Fallback>
   </mc:AlternateContent>
@@ -13059,7 +12980,7 @@
           <a:p>
             <a:r>
               <a:rPr lang="cs-CZ" dirty="0" smtClean="0"/>
-              <a:t>Změny v návrhu</a:t>
+              <a:t>Otázka č. 3</a:t>
             </a:r>
             <a:endParaRPr lang="cs-CZ" dirty="0"/>
           </a:p>
@@ -13075,12 +12996,34 @@
             <p:ph idx="1"/>
           </p:nvPr>
         </p:nvSpPr>
-        <p:spPr/>
+        <p:spPr>
+          <a:xfrm>
+            <a:off x="646112" y="2052918"/>
+            <a:ext cx="10540444" cy="4537887"/>
+          </a:xfrm>
+        </p:spPr>
         <p:txBody>
           <a:bodyPr>
-            <a:normAutofit/>
+            <a:normAutofit fontScale="85000" lnSpcReduction="20000"/>
           </a:bodyPr>
           <a:lstStyle/>
+          <a:p>
+            <a:pPr marL="0" indent="0">
+              <a:lnSpc>
+                <a:spcPct val="150000"/>
+              </a:lnSpc>
+              <a:buNone/>
+            </a:pPr>
+            <a:r>
+              <a:rPr lang="cs-CZ" sz="2800" b="1" dirty="0"/>
+              <a:t>Oproti původní implementaci z roku 2016, jaké změny v návrhu/technologiích byste </a:t>
+            </a:r>
+            <a:r>
+              <a:rPr lang="pt-BR" sz="2800" b="1" dirty="0"/>
+              <a:t>navrhoval s ohledem na dnešní (a budoucí) vývoj?</a:t>
+            </a:r>
+            <a:endParaRPr lang="cs-CZ" sz="2800" b="1" dirty="0"/>
+          </a:p>
           <a:p>
             <a:pPr>
               <a:lnSpc>
@@ -13088,7 +13031,7 @@
               </a:lnSpc>
             </a:pPr>
             <a:r>
-              <a:rPr lang="cs-CZ" sz="2400" dirty="0" smtClean="0"/>
+              <a:rPr lang="cs-CZ" sz="2800" dirty="0" smtClean="0"/>
               <a:t>Úplné oddělení databázové logiky</a:t>
             </a:r>
           </a:p>
@@ -13099,15 +13042,15 @@
               </a:lnSpc>
             </a:pPr>
             <a:r>
-              <a:rPr lang="cs-CZ" sz="2400" dirty="0" smtClean="0"/>
+              <a:rPr lang="cs-CZ" sz="2800" dirty="0" smtClean="0"/>
               <a:t>Rozlišení </a:t>
             </a:r>
             <a:r>
-              <a:rPr lang="cs-CZ" sz="2400" dirty="0" err="1" smtClean="0"/>
+              <a:rPr lang="cs-CZ" sz="2800" dirty="0" err="1" smtClean="0"/>
               <a:t>facade</a:t>
             </a:r>
             <a:r>
-              <a:rPr lang="cs-CZ" sz="2400" dirty="0" smtClean="0"/>
+              <a:rPr lang="cs-CZ" sz="2800" dirty="0" smtClean="0"/>
               <a:t> od modelu</a:t>
             </a:r>
           </a:p>
@@ -13118,7 +13061,7 @@
               </a:lnSpc>
             </a:pPr>
             <a:r>
-              <a:rPr lang="cs-CZ" sz="2400" dirty="0" smtClean="0"/>
+              <a:rPr lang="cs-CZ" sz="2800" dirty="0" smtClean="0"/>
               <a:t>Větší využití REST</a:t>
             </a:r>
           </a:p>
@@ -13129,7 +13072,7 @@
               </a:lnSpc>
             </a:pPr>
             <a:r>
-              <a:rPr lang="cs-CZ" sz="2400" dirty="0" smtClean="0"/>
+              <a:rPr lang="cs-CZ" sz="2800" dirty="0" smtClean="0"/>
               <a:t>Větší využití AJAX</a:t>
             </a:r>
           </a:p>
@@ -13140,7 +13083,7 @@
               </a:lnSpc>
             </a:pPr>
             <a:r>
-              <a:rPr lang="cs-CZ" sz="2400" dirty="0" smtClean="0"/>
+              <a:rPr lang="cs-CZ" sz="2800" dirty="0" smtClean="0"/>
               <a:t>Responsivní design aplikace</a:t>
             </a:r>
           </a:p>
@@ -13164,11 +13107,11 @@
   <p:clrMapOvr>
     <a:masterClrMapping/>
   </p:clrMapOvr>
-  <mc:AlternateContent xmlns:mc="http://schemas.openxmlformats.org/markup-compatibility/2006">
-    <mc:Choice xmlns:p14="http://schemas.microsoft.com/office/powerpoint/2010/main" Requires="p14">
+  <mc:AlternateContent xmlns:mc="http://schemas.openxmlformats.org/markup-compatibility/2006" xmlns:p14="http://schemas.microsoft.com/office/powerpoint/2010/main">
+    <mc:Choice Requires="p14">
       <p:transition p14:dur="0"/>
     </mc:Choice>
-    <mc:Fallback>
+    <mc:Fallback xmlns="">
       <p:transition/>
     </mc:Fallback>
   </mc:AlternateContent>
@@ -16776,11 +16719,11 @@
   <p:clrMapOvr>
     <a:masterClrMapping/>
   </p:clrMapOvr>
-  <mc:AlternateContent xmlns:mc="http://schemas.openxmlformats.org/markup-compatibility/2006">
-    <mc:Choice xmlns:p14="http://schemas.microsoft.com/office/powerpoint/2010/main" Requires="p14">
+  <mc:AlternateContent xmlns:mc="http://schemas.openxmlformats.org/markup-compatibility/2006" xmlns:p14="http://schemas.microsoft.com/office/powerpoint/2010/main">
+    <mc:Choice Requires="p14">
       <p:transition p14:dur="0"/>
     </mc:Choice>
-    <mc:Fallback>
+    <mc:Fallback xmlns="">
       <p:transition/>
     </mc:Fallback>
   </mc:AlternateContent>
@@ -20467,11 +20410,11 @@
   <p:clrMapOvr>
     <a:masterClrMapping/>
   </p:clrMapOvr>
-  <mc:AlternateContent xmlns:mc="http://schemas.openxmlformats.org/markup-compatibility/2006">
-    <mc:Choice xmlns:p14="http://schemas.microsoft.com/office/powerpoint/2010/main" Requires="p14">
+  <mc:AlternateContent xmlns:mc="http://schemas.openxmlformats.org/markup-compatibility/2006" xmlns:p14="http://schemas.microsoft.com/office/powerpoint/2010/main">
+    <mc:Choice Requires="p14">
       <p:transition p14:dur="0"/>
     </mc:Choice>
-    <mc:Fallback>
+    <mc:Fallback xmlns="">
       <p:transition/>
     </mc:Fallback>
   </mc:AlternateContent>
@@ -20564,11 +20507,11 @@
   <p:clrMapOvr>
     <a:masterClrMapping/>
   </p:clrMapOvr>
-  <mc:AlternateContent xmlns:mc="http://schemas.openxmlformats.org/markup-compatibility/2006">
-    <mc:Choice xmlns:p14="http://schemas.microsoft.com/office/powerpoint/2010/main" Requires="p14">
+  <mc:AlternateContent xmlns:mc="http://schemas.openxmlformats.org/markup-compatibility/2006" xmlns:p14="http://schemas.microsoft.com/office/powerpoint/2010/main">
+    <mc:Choice Requires="p14">
       <p:transition p14:dur="0"/>
     </mc:Choice>
-    <mc:Fallback>
+    <mc:Fallback xmlns="">
       <p:transition/>
     </mc:Fallback>
   </mc:AlternateContent>
@@ -20661,11 +20604,11 @@
   <p:clrMapOvr>
     <a:masterClrMapping/>
   </p:clrMapOvr>
-  <mc:AlternateContent xmlns:mc="http://schemas.openxmlformats.org/markup-compatibility/2006">
-    <mc:Choice xmlns:p14="http://schemas.microsoft.com/office/powerpoint/2010/main" Requires="p14">
+  <mc:AlternateContent xmlns:mc="http://schemas.openxmlformats.org/markup-compatibility/2006" xmlns:p14="http://schemas.microsoft.com/office/powerpoint/2010/main">
+    <mc:Choice Requires="p14">
       <p:transition p14:dur="0"/>
     </mc:Choice>
-    <mc:Fallback>
+    <mc:Fallback xmlns="">
       <p:transition/>
     </mc:Fallback>
   </mc:AlternateContent>
@@ -20818,11 +20761,11 @@
   <p:clrMapOvr>
     <a:masterClrMapping/>
   </p:clrMapOvr>
-  <mc:AlternateContent xmlns:mc="http://schemas.openxmlformats.org/markup-compatibility/2006">
-    <mc:Choice xmlns:p14="http://schemas.microsoft.com/office/powerpoint/2010/main" Requires="p14">
+  <mc:AlternateContent xmlns:mc="http://schemas.openxmlformats.org/markup-compatibility/2006" xmlns:p14="http://schemas.microsoft.com/office/powerpoint/2010/main">
+    <mc:Choice Requires="p14">
       <p:transition p14:dur="0"/>
     </mc:Choice>
-    <mc:Fallback>
+    <mc:Fallback xmlns="">
       <p:transition/>
     </mc:Fallback>
   </mc:AlternateContent>
@@ -20957,11 +20900,11 @@
   <p:clrMapOvr>
     <a:masterClrMapping/>
   </p:clrMapOvr>
-  <mc:AlternateContent xmlns:mc="http://schemas.openxmlformats.org/markup-compatibility/2006">
-    <mc:Choice xmlns:p14="http://schemas.microsoft.com/office/powerpoint/2010/main" Requires="p14">
+  <mc:AlternateContent xmlns:mc="http://schemas.openxmlformats.org/markup-compatibility/2006" xmlns:p14="http://schemas.microsoft.com/office/powerpoint/2010/main">
+    <mc:Choice Requires="p14">
       <p:transition p14:dur="0"/>
     </mc:Choice>
-    <mc:Fallback>
+    <mc:Fallback xmlns="">
       <p:transition/>
     </mc:Fallback>
   </mc:AlternateContent>

</xml_diff>

<commit_message>
Návrat k glykemickým situacím
</commit_message>
<xml_diff>
--- a/prezentace diplomka/DP_Diani.pptx
+++ b/prezentace diplomka/DP_Diani.pptx
@@ -10739,8 +10739,12 @@
               </a:lnSpc>
             </a:pPr>
             <a:r>
+              <a:rPr lang="cs-CZ" sz="2400" smtClean="0"/>
+              <a:t>Glykemické </a:t>
+            </a:r>
+            <a:r>
               <a:rPr lang="cs-CZ" sz="2400" dirty="0" smtClean="0"/>
-              <a:t>Situace zvýšené aktivity</a:t>
+              <a:t>situace</a:t>
             </a:r>
             <a:endParaRPr lang="cs-CZ" sz="2400" dirty="0"/>
           </a:p>
@@ -20686,15 +20690,7 @@
             </a:pPr>
             <a:r>
               <a:rPr lang="cs-CZ" sz="2400" dirty="0" smtClean="0"/>
-              <a:t>Dlouhodobá </a:t>
-            </a:r>
-            <a:r>
-              <a:rPr lang="cs-CZ" sz="2400" dirty="0" smtClean="0"/>
-              <a:t>monitorace </a:t>
-            </a:r>
-            <a:r>
-              <a:rPr lang="cs-CZ" sz="2400" dirty="0" smtClean="0"/>
-              <a:t>pacientů</a:t>
+              <a:t>Dlouhodobá monitorace pacientů</a:t>
             </a:r>
           </a:p>
           <a:p>

</xml_diff>